<commit_message>
Nun die richtige Präsi
</commit_message>
<xml_diff>
--- a/Documentation/Präsentation.pptx
+++ b/Documentation/Präsentation.pptx
@@ -323,7 +323,7 @@
             <a:fld id="{051F8514-08BE-4B78-9C3F-47D9B2DEC32E}" type="datetimeFigureOut">
               <a:rPr lang="de-DE" smtClean="0"/>
               <a:pPr/>
-              <a:t>12.09.2017</a:t>
+              <a:t>13.09.2017</a:t>
             </a:fld>
             <a:endParaRPr lang="de-DE"/>
           </a:p>
@@ -491,7 +491,7 @@
             <a:fld id="{8C5F1129-6B38-4E08-B440-45489E13A96F}" type="datetimeFigureOut">
               <a:rPr lang="en-GB" smtClean="0"/>
               <a:pPr/>
-              <a:t>12/09/2017</a:t>
+              <a:t>13/09/2017</a:t>
             </a:fld>
             <a:endParaRPr lang="en-GB"/>
           </a:p>
@@ -2195,7 +2195,7 @@
                   <a:srgbClr val="000000"/>
                 </a:solidFill>
               </a:rPr>
-              <a:t>12.09.2017</a:t>
+              <a:t>13.09.2017</a:t>
             </a:fld>
             <a:endParaRPr lang="en-US" dirty="0">
               <a:solidFill>
@@ -2783,7 +2783,7 @@
                   <a:srgbClr val="000000"/>
                 </a:solidFill>
               </a:rPr>
-              <a:t>12.09.2017</a:t>
+              <a:t>13.09.2017</a:t>
             </a:fld>
             <a:endParaRPr lang="en-US" dirty="0">
               <a:solidFill>
@@ -3192,7 +3192,7 @@
                   <a:srgbClr val="000000"/>
                 </a:solidFill>
               </a:rPr>
-              <a:t>12.09.2017</a:t>
+              <a:t>13.09.2017</a:t>
             </a:fld>
             <a:endParaRPr lang="en-US" dirty="0">
               <a:solidFill>
@@ -3895,7 +3895,7 @@
                   <a:srgbClr val="000000"/>
                 </a:solidFill>
               </a:rPr>
-              <a:t>12.09.2017</a:t>
+              <a:t>13.09.2017</a:t>
             </a:fld>
             <a:endParaRPr lang="en-US" dirty="0">
               <a:solidFill>
@@ -4826,7 +4826,7 @@
                   <a:srgbClr val="000000"/>
                 </a:solidFill>
               </a:rPr>
-              <a:t>12.09.2017</a:t>
+              <a:t>13.09.2017</a:t>
             </a:fld>
             <a:endParaRPr lang="en-US" dirty="0">
               <a:solidFill>
@@ -5590,7 +5590,7 @@
                   <a:srgbClr val="000000"/>
                 </a:solidFill>
               </a:rPr>
-              <a:t>12.09.2017</a:t>
+              <a:t>13.09.2017</a:t>
             </a:fld>
             <a:endParaRPr lang="en-US" dirty="0">
               <a:solidFill>
@@ -5881,7 +5881,7 @@
           <a:p>
             <a:fld id="{C326269A-2E67-4F11-958D-77F23BC86D56}" type="datetime1">
               <a:rPr lang="de-DE" noProof="0" smtClean="0"/>
-              <a:t>12.09.2017</a:t>
+              <a:t>13.09.2017</a:t>
             </a:fld>
             <a:endParaRPr lang="de-DE" noProof="0"/>
           </a:p>
@@ -7481,7 +7481,7 @@
           <a:p>
             <a:fld id="{4A3E872F-FBC5-4310-916F-2A19E751796F}" type="datetime1">
               <a:rPr lang="de-DE" noProof="0" smtClean="0"/>
-              <a:t>12.09.2017</a:t>
+              <a:t>13.09.2017</a:t>
             </a:fld>
             <a:endParaRPr lang="en-US" noProof="0"/>
           </a:p>
@@ -9101,7 +9101,7 @@
                   <a:srgbClr val="000000"/>
                 </a:solidFill>
               </a:rPr>
-              <a:t>12.09.2017</a:t>
+              <a:t>13.09.2017</a:t>
             </a:fld>
             <a:endParaRPr lang="en-US" dirty="0">
               <a:solidFill>
@@ -9285,7 +9285,7 @@
           <a:p>
             <a:fld id="{D01F4938-0F46-45E6-A271-27A71E4ADECE}" type="datetime1">
               <a:rPr lang="de-DE" noProof="0" smtClean="0"/>
-              <a:t>12.09.2017</a:t>
+              <a:t>13.09.2017</a:t>
             </a:fld>
             <a:endParaRPr lang="en-US" noProof="0"/>
           </a:p>
@@ -9399,7 +9399,7 @@
           <p:cNvPr id="2" name="Titel 1">
             <a:extLst>
               <a:ext uri="{FF2B5EF4-FFF2-40B4-BE49-F238E27FC236}">
-                <a16:creationId xmlns:a16="http://schemas.microsoft.com/office/drawing/2014/main" xmlns="" id="{B548D912-5D5D-404C-9197-3F32C97A23B1}"/>
+                <a16:creationId xmlns="" xmlns:a16="http://schemas.microsoft.com/office/drawing/2014/main" id="{B548D912-5D5D-404C-9197-3F32C97A23B1}"/>
               </a:ext>
             </a:extLst>
           </p:cNvPr>
@@ -9436,7 +9436,7 @@
           <p:cNvPr id="3" name="Untertitel 2">
             <a:extLst>
               <a:ext uri="{FF2B5EF4-FFF2-40B4-BE49-F238E27FC236}">
-                <a16:creationId xmlns:a16="http://schemas.microsoft.com/office/drawing/2014/main" xmlns="" id="{A7A859B5-DAA5-4171-A412-67E4CC691171}"/>
+                <a16:creationId xmlns="" xmlns:a16="http://schemas.microsoft.com/office/drawing/2014/main" id="{A7A859B5-DAA5-4171-A412-67E4CC691171}"/>
               </a:ext>
             </a:extLst>
           </p:cNvPr>
@@ -9506,7 +9506,7 @@
           <p:cNvPr id="4" name="Datumsplatzhalter 3">
             <a:extLst>
               <a:ext uri="{FF2B5EF4-FFF2-40B4-BE49-F238E27FC236}">
-                <a16:creationId xmlns:a16="http://schemas.microsoft.com/office/drawing/2014/main" xmlns="" id="{8ACF4445-647E-4F40-BEAE-95DD88A77411}"/>
+                <a16:creationId xmlns="" xmlns:a16="http://schemas.microsoft.com/office/drawing/2014/main" id="{8ACF4445-647E-4F40-BEAE-95DD88A77411}"/>
               </a:ext>
             </a:extLst>
           </p:cNvPr>
@@ -9530,7 +9530,7 @@
                   </a:prstClr>
                 </a:solidFill>
               </a:rPr>
-              <a:t>12.09.2017</a:t>
+              <a:t>13.09.2017</a:t>
             </a:fld>
             <a:endParaRPr lang="de-DE">
               <a:solidFill>
@@ -9547,7 +9547,7 @@
           <p:cNvPr id="5" name="Fußzeilenplatzhalter 4">
             <a:extLst>
               <a:ext uri="{FF2B5EF4-FFF2-40B4-BE49-F238E27FC236}">
-                <a16:creationId xmlns:a16="http://schemas.microsoft.com/office/drawing/2014/main" xmlns="" id="{79398AE5-DBDA-4F41-B808-6DB700D84598}"/>
+                <a16:creationId xmlns="" xmlns:a16="http://schemas.microsoft.com/office/drawing/2014/main" id="{79398AE5-DBDA-4F41-B808-6DB700D84598}"/>
               </a:ext>
             </a:extLst>
           </p:cNvPr>
@@ -9588,7 +9588,7 @@
           <p:cNvPr id="6" name="Foliennummernplatzhalter 5">
             <a:extLst>
               <a:ext uri="{FF2B5EF4-FFF2-40B4-BE49-F238E27FC236}">
-                <a16:creationId xmlns:a16="http://schemas.microsoft.com/office/drawing/2014/main" xmlns="" id="{783C2E31-C455-4E63-A969-188015F5CC2E}"/>
+                <a16:creationId xmlns="" xmlns:a16="http://schemas.microsoft.com/office/drawing/2014/main" id="{783C2E31-C455-4E63-A969-188015F5CC2E}"/>
               </a:ext>
             </a:extLst>
           </p:cNvPr>
@@ -9660,7 +9660,7 @@
           <p:cNvPr id="2" name="Titel 1">
             <a:extLst>
               <a:ext uri="{FF2B5EF4-FFF2-40B4-BE49-F238E27FC236}">
-                <a16:creationId xmlns:a16="http://schemas.microsoft.com/office/drawing/2014/main" xmlns="" id="{0C18661C-E030-40E5-90E5-EBF98E2930FC}"/>
+                <a16:creationId xmlns="" xmlns:a16="http://schemas.microsoft.com/office/drawing/2014/main" id="{0C18661C-E030-40E5-90E5-EBF98E2930FC}"/>
               </a:ext>
             </a:extLst>
           </p:cNvPr>
@@ -9688,7 +9688,7 @@
           <p:cNvPr id="3" name="Inhaltsplatzhalter 2">
             <a:extLst>
               <a:ext uri="{FF2B5EF4-FFF2-40B4-BE49-F238E27FC236}">
-                <a16:creationId xmlns:a16="http://schemas.microsoft.com/office/drawing/2014/main" xmlns="" id="{C70E25F6-48F8-4C6E-88BB-6FFA6E756793}"/>
+                <a16:creationId xmlns="" xmlns:a16="http://schemas.microsoft.com/office/drawing/2014/main" id="{C70E25F6-48F8-4C6E-88BB-6FFA6E756793}"/>
               </a:ext>
             </a:extLst>
           </p:cNvPr>
@@ -9745,7 +9745,7 @@
           <p:cNvPr id="4" name="Datumsplatzhalter 3">
             <a:extLst>
               <a:ext uri="{FF2B5EF4-FFF2-40B4-BE49-F238E27FC236}">
-                <a16:creationId xmlns:a16="http://schemas.microsoft.com/office/drawing/2014/main" xmlns="" id="{DCC231CB-233E-4E75-947B-08381C778EF7}"/>
+                <a16:creationId xmlns="" xmlns:a16="http://schemas.microsoft.com/office/drawing/2014/main" id="{DCC231CB-233E-4E75-947B-08381C778EF7}"/>
               </a:ext>
             </a:extLst>
           </p:cNvPr>
@@ -9769,7 +9769,7 @@
                   </a:prstClr>
                 </a:solidFill>
               </a:rPr>
-              <a:t>12.09.2017</a:t>
+              <a:t>13.09.2017</a:t>
             </a:fld>
             <a:endParaRPr lang="de-DE">
               <a:solidFill>
@@ -9786,7 +9786,7 @@
           <p:cNvPr id="5" name="Fußzeilenplatzhalter 4">
             <a:extLst>
               <a:ext uri="{FF2B5EF4-FFF2-40B4-BE49-F238E27FC236}">
-                <a16:creationId xmlns:a16="http://schemas.microsoft.com/office/drawing/2014/main" xmlns="" id="{5DB103C3-CDCB-416C-85C6-B0A72C8E2547}"/>
+                <a16:creationId xmlns="" xmlns:a16="http://schemas.microsoft.com/office/drawing/2014/main" id="{5DB103C3-CDCB-416C-85C6-B0A72C8E2547}"/>
               </a:ext>
             </a:extLst>
           </p:cNvPr>
@@ -9827,7 +9827,7 @@
           <p:cNvPr id="6" name="Foliennummernplatzhalter 5">
             <a:extLst>
               <a:ext uri="{FF2B5EF4-FFF2-40B4-BE49-F238E27FC236}">
-                <a16:creationId xmlns:a16="http://schemas.microsoft.com/office/drawing/2014/main" xmlns="" id="{F91E8D97-F3C4-4C7B-9B95-0422049F8E07}"/>
+                <a16:creationId xmlns="" xmlns:a16="http://schemas.microsoft.com/office/drawing/2014/main" id="{F91E8D97-F3C4-4C7B-9B95-0422049F8E07}"/>
               </a:ext>
             </a:extLst>
           </p:cNvPr>
@@ -9899,7 +9899,7 @@
           <p:cNvPr id="2" name="Titel 1">
             <a:extLst>
               <a:ext uri="{FF2B5EF4-FFF2-40B4-BE49-F238E27FC236}">
-                <a16:creationId xmlns:a16="http://schemas.microsoft.com/office/drawing/2014/main" xmlns="" id="{27E3C20D-4436-47B6-990D-85C4CCAA8294}"/>
+                <a16:creationId xmlns="" xmlns:a16="http://schemas.microsoft.com/office/drawing/2014/main" id="{27E3C20D-4436-47B6-990D-85C4CCAA8294}"/>
               </a:ext>
             </a:extLst>
           </p:cNvPr>
@@ -9936,7 +9936,7 @@
           <p:cNvPr id="3" name="Textplatzhalter 2">
             <a:extLst>
               <a:ext uri="{FF2B5EF4-FFF2-40B4-BE49-F238E27FC236}">
-                <a16:creationId xmlns:a16="http://schemas.microsoft.com/office/drawing/2014/main" xmlns="" id="{BA8FEB50-313F-4EFD-8234-33A16010AC7E}"/>
+                <a16:creationId xmlns="" xmlns:a16="http://schemas.microsoft.com/office/drawing/2014/main" id="{BA8FEB50-313F-4EFD-8234-33A16010AC7E}"/>
               </a:ext>
             </a:extLst>
           </p:cNvPr>
@@ -10061,7 +10061,7 @@
           <p:cNvPr id="4" name="Datumsplatzhalter 3">
             <a:extLst>
               <a:ext uri="{FF2B5EF4-FFF2-40B4-BE49-F238E27FC236}">
-                <a16:creationId xmlns:a16="http://schemas.microsoft.com/office/drawing/2014/main" xmlns="" id="{ADE1F284-5EED-41D1-92A7-E0910D7CA876}"/>
+                <a16:creationId xmlns="" xmlns:a16="http://schemas.microsoft.com/office/drawing/2014/main" id="{ADE1F284-5EED-41D1-92A7-E0910D7CA876}"/>
               </a:ext>
             </a:extLst>
           </p:cNvPr>
@@ -10085,7 +10085,7 @@
                   </a:prstClr>
                 </a:solidFill>
               </a:rPr>
-              <a:t>12.09.2017</a:t>
+              <a:t>13.09.2017</a:t>
             </a:fld>
             <a:endParaRPr lang="de-DE">
               <a:solidFill>
@@ -10102,7 +10102,7 @@
           <p:cNvPr id="5" name="Fußzeilenplatzhalter 4">
             <a:extLst>
               <a:ext uri="{FF2B5EF4-FFF2-40B4-BE49-F238E27FC236}">
-                <a16:creationId xmlns:a16="http://schemas.microsoft.com/office/drawing/2014/main" xmlns="" id="{1F527557-1771-402E-A145-C311ED579013}"/>
+                <a16:creationId xmlns="" xmlns:a16="http://schemas.microsoft.com/office/drawing/2014/main" id="{1F527557-1771-402E-A145-C311ED579013}"/>
               </a:ext>
             </a:extLst>
           </p:cNvPr>
@@ -10143,7 +10143,7 @@
           <p:cNvPr id="6" name="Foliennummernplatzhalter 5">
             <a:extLst>
               <a:ext uri="{FF2B5EF4-FFF2-40B4-BE49-F238E27FC236}">
-                <a16:creationId xmlns:a16="http://schemas.microsoft.com/office/drawing/2014/main" xmlns="" id="{1DB1DDD4-68BD-480F-A9AA-E99BE0B93A70}"/>
+                <a16:creationId xmlns="" xmlns:a16="http://schemas.microsoft.com/office/drawing/2014/main" id="{1DB1DDD4-68BD-480F-A9AA-E99BE0B93A70}"/>
               </a:ext>
             </a:extLst>
           </p:cNvPr>
@@ -10215,7 +10215,7 @@
           <p:cNvPr id="2" name="Titel 1">
             <a:extLst>
               <a:ext uri="{FF2B5EF4-FFF2-40B4-BE49-F238E27FC236}">
-                <a16:creationId xmlns:a16="http://schemas.microsoft.com/office/drawing/2014/main" xmlns="" id="{4552CB55-2539-4426-BF73-4DA552452622}"/>
+                <a16:creationId xmlns="" xmlns:a16="http://schemas.microsoft.com/office/drawing/2014/main" id="{4552CB55-2539-4426-BF73-4DA552452622}"/>
               </a:ext>
             </a:extLst>
           </p:cNvPr>
@@ -10243,7 +10243,7 @@
           <p:cNvPr id="3" name="Inhaltsplatzhalter 2">
             <a:extLst>
               <a:ext uri="{FF2B5EF4-FFF2-40B4-BE49-F238E27FC236}">
-                <a16:creationId xmlns:a16="http://schemas.microsoft.com/office/drawing/2014/main" xmlns="" id="{B3AA64D0-2391-4A9E-82EB-43AD0B41E8D4}"/>
+                <a16:creationId xmlns="" xmlns:a16="http://schemas.microsoft.com/office/drawing/2014/main" id="{B3AA64D0-2391-4A9E-82EB-43AD0B41E8D4}"/>
               </a:ext>
             </a:extLst>
           </p:cNvPr>
@@ -10305,7 +10305,7 @@
           <p:cNvPr id="4" name="Inhaltsplatzhalter 3">
             <a:extLst>
               <a:ext uri="{FF2B5EF4-FFF2-40B4-BE49-F238E27FC236}">
-                <a16:creationId xmlns:a16="http://schemas.microsoft.com/office/drawing/2014/main" xmlns="" id="{6E7A1C1B-44AE-4A30-8E85-FC486FE5F25E}"/>
+                <a16:creationId xmlns="" xmlns:a16="http://schemas.microsoft.com/office/drawing/2014/main" id="{6E7A1C1B-44AE-4A30-8E85-FC486FE5F25E}"/>
               </a:ext>
             </a:extLst>
           </p:cNvPr>
@@ -10367,7 +10367,7 @@
           <p:cNvPr id="5" name="Datumsplatzhalter 4">
             <a:extLst>
               <a:ext uri="{FF2B5EF4-FFF2-40B4-BE49-F238E27FC236}">
-                <a16:creationId xmlns:a16="http://schemas.microsoft.com/office/drawing/2014/main" xmlns="" id="{27F680E6-8A42-40A3-9991-7117B7753D2D}"/>
+                <a16:creationId xmlns="" xmlns:a16="http://schemas.microsoft.com/office/drawing/2014/main" id="{27F680E6-8A42-40A3-9991-7117B7753D2D}"/>
               </a:ext>
             </a:extLst>
           </p:cNvPr>
@@ -10391,7 +10391,7 @@
                   </a:prstClr>
                 </a:solidFill>
               </a:rPr>
-              <a:t>12.09.2017</a:t>
+              <a:t>13.09.2017</a:t>
             </a:fld>
             <a:endParaRPr lang="de-DE">
               <a:solidFill>
@@ -10408,7 +10408,7 @@
           <p:cNvPr id="6" name="Fußzeilenplatzhalter 5">
             <a:extLst>
               <a:ext uri="{FF2B5EF4-FFF2-40B4-BE49-F238E27FC236}">
-                <a16:creationId xmlns:a16="http://schemas.microsoft.com/office/drawing/2014/main" xmlns="" id="{96B21538-DB3F-48D6-B437-C34EA1559EE4}"/>
+                <a16:creationId xmlns="" xmlns:a16="http://schemas.microsoft.com/office/drawing/2014/main" id="{96B21538-DB3F-48D6-B437-C34EA1559EE4}"/>
               </a:ext>
             </a:extLst>
           </p:cNvPr>
@@ -10449,7 +10449,7 @@
           <p:cNvPr id="7" name="Foliennummernplatzhalter 6">
             <a:extLst>
               <a:ext uri="{FF2B5EF4-FFF2-40B4-BE49-F238E27FC236}">
-                <a16:creationId xmlns:a16="http://schemas.microsoft.com/office/drawing/2014/main" xmlns="" id="{694EC2F0-469C-465E-A12C-161DB035E8EC}"/>
+                <a16:creationId xmlns="" xmlns:a16="http://schemas.microsoft.com/office/drawing/2014/main" id="{694EC2F0-469C-465E-A12C-161DB035E8EC}"/>
               </a:ext>
             </a:extLst>
           </p:cNvPr>
@@ -10521,7 +10521,7 @@
           <p:cNvPr id="2" name="Titel 1">
             <a:extLst>
               <a:ext uri="{FF2B5EF4-FFF2-40B4-BE49-F238E27FC236}">
-                <a16:creationId xmlns:a16="http://schemas.microsoft.com/office/drawing/2014/main" xmlns="" id="{BCB5056A-F3D6-41EF-9BCB-26C0B9571FA2}"/>
+                <a16:creationId xmlns="" xmlns:a16="http://schemas.microsoft.com/office/drawing/2014/main" id="{BCB5056A-F3D6-41EF-9BCB-26C0B9571FA2}"/>
               </a:ext>
             </a:extLst>
           </p:cNvPr>
@@ -10554,7 +10554,7 @@
           <p:cNvPr id="3" name="Textplatzhalter 2">
             <a:extLst>
               <a:ext uri="{FF2B5EF4-FFF2-40B4-BE49-F238E27FC236}">
-                <a16:creationId xmlns:a16="http://schemas.microsoft.com/office/drawing/2014/main" xmlns="" id="{D9DDA0CF-116F-4EC7-A2D2-8351B0504DEC}"/>
+                <a16:creationId xmlns="" xmlns:a16="http://schemas.microsoft.com/office/drawing/2014/main" id="{D9DDA0CF-116F-4EC7-A2D2-8351B0504DEC}"/>
               </a:ext>
             </a:extLst>
           </p:cNvPr>
@@ -10625,7 +10625,7 @@
           <p:cNvPr id="4" name="Inhaltsplatzhalter 3">
             <a:extLst>
               <a:ext uri="{FF2B5EF4-FFF2-40B4-BE49-F238E27FC236}">
-                <a16:creationId xmlns:a16="http://schemas.microsoft.com/office/drawing/2014/main" xmlns="" id="{0DEC7B34-53E2-42E8-AE4A-89254BDE99E7}"/>
+                <a16:creationId xmlns="" xmlns:a16="http://schemas.microsoft.com/office/drawing/2014/main" id="{0DEC7B34-53E2-42E8-AE4A-89254BDE99E7}"/>
               </a:ext>
             </a:extLst>
           </p:cNvPr>
@@ -10687,7 +10687,7 @@
           <p:cNvPr id="5" name="Textplatzhalter 4">
             <a:extLst>
               <a:ext uri="{FF2B5EF4-FFF2-40B4-BE49-F238E27FC236}">
-                <a16:creationId xmlns:a16="http://schemas.microsoft.com/office/drawing/2014/main" xmlns="" id="{89A4D379-119F-47DA-8EF5-EE05FFE8286A}"/>
+                <a16:creationId xmlns="" xmlns:a16="http://schemas.microsoft.com/office/drawing/2014/main" id="{89A4D379-119F-47DA-8EF5-EE05FFE8286A}"/>
               </a:ext>
             </a:extLst>
           </p:cNvPr>
@@ -10758,7 +10758,7 @@
           <p:cNvPr id="6" name="Inhaltsplatzhalter 5">
             <a:extLst>
               <a:ext uri="{FF2B5EF4-FFF2-40B4-BE49-F238E27FC236}">
-                <a16:creationId xmlns:a16="http://schemas.microsoft.com/office/drawing/2014/main" xmlns="" id="{941F8921-80F6-4A06-9D2E-52ACF05CBAB7}"/>
+                <a16:creationId xmlns="" xmlns:a16="http://schemas.microsoft.com/office/drawing/2014/main" id="{941F8921-80F6-4A06-9D2E-52ACF05CBAB7}"/>
               </a:ext>
             </a:extLst>
           </p:cNvPr>
@@ -10820,7 +10820,7 @@
           <p:cNvPr id="7" name="Datumsplatzhalter 6">
             <a:extLst>
               <a:ext uri="{FF2B5EF4-FFF2-40B4-BE49-F238E27FC236}">
-                <a16:creationId xmlns:a16="http://schemas.microsoft.com/office/drawing/2014/main" xmlns="" id="{BF404AF3-4542-4601-967D-E7DD05B89C18}"/>
+                <a16:creationId xmlns="" xmlns:a16="http://schemas.microsoft.com/office/drawing/2014/main" id="{BF404AF3-4542-4601-967D-E7DD05B89C18}"/>
               </a:ext>
             </a:extLst>
           </p:cNvPr>
@@ -10844,7 +10844,7 @@
                   </a:prstClr>
                 </a:solidFill>
               </a:rPr>
-              <a:t>12.09.2017</a:t>
+              <a:t>13.09.2017</a:t>
             </a:fld>
             <a:endParaRPr lang="de-DE">
               <a:solidFill>
@@ -10861,7 +10861,7 @@
           <p:cNvPr id="8" name="Fußzeilenplatzhalter 7">
             <a:extLst>
               <a:ext uri="{FF2B5EF4-FFF2-40B4-BE49-F238E27FC236}">
-                <a16:creationId xmlns:a16="http://schemas.microsoft.com/office/drawing/2014/main" xmlns="" id="{265C0515-770F-44A3-9693-DE4F0FA5591D}"/>
+                <a16:creationId xmlns="" xmlns:a16="http://schemas.microsoft.com/office/drawing/2014/main" id="{265C0515-770F-44A3-9693-DE4F0FA5591D}"/>
               </a:ext>
             </a:extLst>
           </p:cNvPr>
@@ -10902,7 +10902,7 @@
           <p:cNvPr id="9" name="Foliennummernplatzhalter 8">
             <a:extLst>
               <a:ext uri="{FF2B5EF4-FFF2-40B4-BE49-F238E27FC236}">
-                <a16:creationId xmlns:a16="http://schemas.microsoft.com/office/drawing/2014/main" xmlns="" id="{44E0BD46-8DB3-49A2-8422-30252E46D3F0}"/>
+                <a16:creationId xmlns="" xmlns:a16="http://schemas.microsoft.com/office/drawing/2014/main" id="{44E0BD46-8DB3-49A2-8422-30252E46D3F0}"/>
               </a:ext>
             </a:extLst>
           </p:cNvPr>
@@ -10974,7 +10974,7 @@
           <p:cNvPr id="2" name="Titel 1">
             <a:extLst>
               <a:ext uri="{FF2B5EF4-FFF2-40B4-BE49-F238E27FC236}">
-                <a16:creationId xmlns:a16="http://schemas.microsoft.com/office/drawing/2014/main" xmlns="" id="{CC57E374-267D-44F2-9BA8-6557320D5097}"/>
+                <a16:creationId xmlns="" xmlns:a16="http://schemas.microsoft.com/office/drawing/2014/main" id="{CC57E374-267D-44F2-9BA8-6557320D5097}"/>
               </a:ext>
             </a:extLst>
           </p:cNvPr>
@@ -11002,7 +11002,7 @@
           <p:cNvPr id="3" name="Datumsplatzhalter 2">
             <a:extLst>
               <a:ext uri="{FF2B5EF4-FFF2-40B4-BE49-F238E27FC236}">
-                <a16:creationId xmlns:a16="http://schemas.microsoft.com/office/drawing/2014/main" xmlns="" id="{3BE0F40C-66C3-4C9F-BF02-1683CA0B2FA1}"/>
+                <a16:creationId xmlns="" xmlns:a16="http://schemas.microsoft.com/office/drawing/2014/main" id="{3BE0F40C-66C3-4C9F-BF02-1683CA0B2FA1}"/>
               </a:ext>
             </a:extLst>
           </p:cNvPr>
@@ -11026,7 +11026,7 @@
                   </a:prstClr>
                 </a:solidFill>
               </a:rPr>
-              <a:t>12.09.2017</a:t>
+              <a:t>13.09.2017</a:t>
             </a:fld>
             <a:endParaRPr lang="de-DE">
               <a:solidFill>
@@ -11043,7 +11043,7 @@
           <p:cNvPr id="4" name="Fußzeilenplatzhalter 3">
             <a:extLst>
               <a:ext uri="{FF2B5EF4-FFF2-40B4-BE49-F238E27FC236}">
-                <a16:creationId xmlns:a16="http://schemas.microsoft.com/office/drawing/2014/main" xmlns="" id="{C5263F7F-EC32-47BE-BE0A-0C25CDDE9162}"/>
+                <a16:creationId xmlns="" xmlns:a16="http://schemas.microsoft.com/office/drawing/2014/main" id="{C5263F7F-EC32-47BE-BE0A-0C25CDDE9162}"/>
               </a:ext>
             </a:extLst>
           </p:cNvPr>
@@ -11084,7 +11084,7 @@
           <p:cNvPr id="5" name="Foliennummernplatzhalter 4">
             <a:extLst>
               <a:ext uri="{FF2B5EF4-FFF2-40B4-BE49-F238E27FC236}">
-                <a16:creationId xmlns:a16="http://schemas.microsoft.com/office/drawing/2014/main" xmlns="" id="{5AEBBBC5-C01A-436D-B247-8AF2FA11F2BE}"/>
+                <a16:creationId xmlns="" xmlns:a16="http://schemas.microsoft.com/office/drawing/2014/main" id="{5AEBBBC5-C01A-436D-B247-8AF2FA11F2BE}"/>
               </a:ext>
             </a:extLst>
           </p:cNvPr>
@@ -11156,7 +11156,7 @@
           <p:cNvPr id="2" name="Datumsplatzhalter 1">
             <a:extLst>
               <a:ext uri="{FF2B5EF4-FFF2-40B4-BE49-F238E27FC236}">
-                <a16:creationId xmlns:a16="http://schemas.microsoft.com/office/drawing/2014/main" xmlns="" id="{DDCE00C2-04AB-4241-834D-BE064D7B64EE}"/>
+                <a16:creationId xmlns="" xmlns:a16="http://schemas.microsoft.com/office/drawing/2014/main" id="{DDCE00C2-04AB-4241-834D-BE064D7B64EE}"/>
               </a:ext>
             </a:extLst>
           </p:cNvPr>
@@ -11180,7 +11180,7 @@
                   </a:prstClr>
                 </a:solidFill>
               </a:rPr>
-              <a:t>12.09.2017</a:t>
+              <a:t>13.09.2017</a:t>
             </a:fld>
             <a:endParaRPr lang="de-DE">
               <a:solidFill>
@@ -11197,7 +11197,7 @@
           <p:cNvPr id="3" name="Fußzeilenplatzhalter 2">
             <a:extLst>
               <a:ext uri="{FF2B5EF4-FFF2-40B4-BE49-F238E27FC236}">
-                <a16:creationId xmlns:a16="http://schemas.microsoft.com/office/drawing/2014/main" xmlns="" id="{77C91F00-B34B-4654-B7F7-12BF99AB9B0E}"/>
+                <a16:creationId xmlns="" xmlns:a16="http://schemas.microsoft.com/office/drawing/2014/main" id="{77C91F00-B34B-4654-B7F7-12BF99AB9B0E}"/>
               </a:ext>
             </a:extLst>
           </p:cNvPr>
@@ -11238,7 +11238,7 @@
           <p:cNvPr id="4" name="Foliennummernplatzhalter 3">
             <a:extLst>
               <a:ext uri="{FF2B5EF4-FFF2-40B4-BE49-F238E27FC236}">
-                <a16:creationId xmlns:a16="http://schemas.microsoft.com/office/drawing/2014/main" xmlns="" id="{699091F1-2F2C-42EF-8F1F-CA076A6180F0}"/>
+                <a16:creationId xmlns="" xmlns:a16="http://schemas.microsoft.com/office/drawing/2014/main" id="{699091F1-2F2C-42EF-8F1F-CA076A6180F0}"/>
               </a:ext>
             </a:extLst>
           </p:cNvPr>
@@ -11310,7 +11310,7 @@
           <p:cNvPr id="2" name="Titel 1">
             <a:extLst>
               <a:ext uri="{FF2B5EF4-FFF2-40B4-BE49-F238E27FC236}">
-                <a16:creationId xmlns:a16="http://schemas.microsoft.com/office/drawing/2014/main" xmlns="" id="{F06FB229-956A-4FC3-A601-A0AE4BF6D2CD}"/>
+                <a16:creationId xmlns="" xmlns:a16="http://schemas.microsoft.com/office/drawing/2014/main" id="{F06FB229-956A-4FC3-A601-A0AE4BF6D2CD}"/>
               </a:ext>
             </a:extLst>
           </p:cNvPr>
@@ -11347,7 +11347,7 @@
           <p:cNvPr id="3" name="Inhaltsplatzhalter 2">
             <a:extLst>
               <a:ext uri="{FF2B5EF4-FFF2-40B4-BE49-F238E27FC236}">
-                <a16:creationId xmlns:a16="http://schemas.microsoft.com/office/drawing/2014/main" xmlns="" id="{77C288AB-7F48-4654-AC1C-5844C26A718D}"/>
+                <a16:creationId xmlns="" xmlns:a16="http://schemas.microsoft.com/office/drawing/2014/main" id="{77C288AB-7F48-4654-AC1C-5844C26A718D}"/>
               </a:ext>
             </a:extLst>
           </p:cNvPr>
@@ -11437,7 +11437,7 @@
           <p:cNvPr id="4" name="Textplatzhalter 3">
             <a:extLst>
               <a:ext uri="{FF2B5EF4-FFF2-40B4-BE49-F238E27FC236}">
-                <a16:creationId xmlns:a16="http://schemas.microsoft.com/office/drawing/2014/main" xmlns="" id="{816A0FC8-5340-41CE-9D7F-D5E40D105614}"/>
+                <a16:creationId xmlns="" xmlns:a16="http://schemas.microsoft.com/office/drawing/2014/main" id="{816A0FC8-5340-41CE-9D7F-D5E40D105614}"/>
               </a:ext>
             </a:extLst>
           </p:cNvPr>
@@ -11508,7 +11508,7 @@
           <p:cNvPr id="5" name="Datumsplatzhalter 4">
             <a:extLst>
               <a:ext uri="{FF2B5EF4-FFF2-40B4-BE49-F238E27FC236}">
-                <a16:creationId xmlns:a16="http://schemas.microsoft.com/office/drawing/2014/main" xmlns="" id="{19A682CF-3F78-4739-9B07-7CE1EADC724A}"/>
+                <a16:creationId xmlns="" xmlns:a16="http://schemas.microsoft.com/office/drawing/2014/main" id="{19A682CF-3F78-4739-9B07-7CE1EADC724A}"/>
               </a:ext>
             </a:extLst>
           </p:cNvPr>
@@ -11532,7 +11532,7 @@
                   </a:prstClr>
                 </a:solidFill>
               </a:rPr>
-              <a:t>12.09.2017</a:t>
+              <a:t>13.09.2017</a:t>
             </a:fld>
             <a:endParaRPr lang="de-DE">
               <a:solidFill>
@@ -11549,7 +11549,7 @@
           <p:cNvPr id="6" name="Fußzeilenplatzhalter 5">
             <a:extLst>
               <a:ext uri="{FF2B5EF4-FFF2-40B4-BE49-F238E27FC236}">
-                <a16:creationId xmlns:a16="http://schemas.microsoft.com/office/drawing/2014/main" xmlns="" id="{042C8767-64B3-4151-9EB8-0F9D7A7E9977}"/>
+                <a16:creationId xmlns="" xmlns:a16="http://schemas.microsoft.com/office/drawing/2014/main" id="{042C8767-64B3-4151-9EB8-0F9D7A7E9977}"/>
               </a:ext>
             </a:extLst>
           </p:cNvPr>
@@ -11590,7 +11590,7 @@
           <p:cNvPr id="7" name="Foliennummernplatzhalter 6">
             <a:extLst>
               <a:ext uri="{FF2B5EF4-FFF2-40B4-BE49-F238E27FC236}">
-                <a16:creationId xmlns:a16="http://schemas.microsoft.com/office/drawing/2014/main" xmlns="" id="{28B1985B-D826-481C-BC22-6D616BBC92AF}"/>
+                <a16:creationId xmlns="" xmlns:a16="http://schemas.microsoft.com/office/drawing/2014/main" id="{28B1985B-D826-481C-BC22-6D616BBC92AF}"/>
               </a:ext>
             </a:extLst>
           </p:cNvPr>
@@ -11662,7 +11662,7 @@
           <p:cNvPr id="2" name="Titel 1">
             <a:extLst>
               <a:ext uri="{FF2B5EF4-FFF2-40B4-BE49-F238E27FC236}">
-                <a16:creationId xmlns:a16="http://schemas.microsoft.com/office/drawing/2014/main" xmlns="" id="{527C8192-F068-49DD-9D45-9C0FA71E6158}"/>
+                <a16:creationId xmlns="" xmlns:a16="http://schemas.microsoft.com/office/drawing/2014/main" id="{527C8192-F068-49DD-9D45-9C0FA71E6158}"/>
               </a:ext>
             </a:extLst>
           </p:cNvPr>
@@ -11699,7 +11699,7 @@
           <p:cNvPr id="3" name="Bildplatzhalter 2">
             <a:extLst>
               <a:ext uri="{FF2B5EF4-FFF2-40B4-BE49-F238E27FC236}">
-                <a16:creationId xmlns:a16="http://schemas.microsoft.com/office/drawing/2014/main" xmlns="" id="{D911F59A-C665-49BD-B41D-413CCCF7100B}"/>
+                <a16:creationId xmlns="" xmlns:a16="http://schemas.microsoft.com/office/drawing/2014/main" id="{D911F59A-C665-49BD-B41D-413CCCF7100B}"/>
               </a:ext>
             </a:extLst>
           </p:cNvPr>
@@ -11766,7 +11766,7 @@
           <p:cNvPr id="4" name="Textplatzhalter 3">
             <a:extLst>
               <a:ext uri="{FF2B5EF4-FFF2-40B4-BE49-F238E27FC236}">
-                <a16:creationId xmlns:a16="http://schemas.microsoft.com/office/drawing/2014/main" xmlns="" id="{0D2DB7AF-116E-4FF2-BDC3-7F062F23153B}"/>
+                <a16:creationId xmlns="" xmlns:a16="http://schemas.microsoft.com/office/drawing/2014/main" id="{0D2DB7AF-116E-4FF2-BDC3-7F062F23153B}"/>
               </a:ext>
             </a:extLst>
           </p:cNvPr>
@@ -11837,7 +11837,7 @@
           <p:cNvPr id="5" name="Datumsplatzhalter 4">
             <a:extLst>
               <a:ext uri="{FF2B5EF4-FFF2-40B4-BE49-F238E27FC236}">
-                <a16:creationId xmlns:a16="http://schemas.microsoft.com/office/drawing/2014/main" xmlns="" id="{F6C9E9C5-B341-4BF8-9201-3815A53E6B05}"/>
+                <a16:creationId xmlns="" xmlns:a16="http://schemas.microsoft.com/office/drawing/2014/main" id="{F6C9E9C5-B341-4BF8-9201-3815A53E6B05}"/>
               </a:ext>
             </a:extLst>
           </p:cNvPr>
@@ -11861,7 +11861,7 @@
                   </a:prstClr>
                 </a:solidFill>
               </a:rPr>
-              <a:t>12.09.2017</a:t>
+              <a:t>13.09.2017</a:t>
             </a:fld>
             <a:endParaRPr lang="de-DE">
               <a:solidFill>
@@ -11878,7 +11878,7 @@
           <p:cNvPr id="6" name="Fußzeilenplatzhalter 5">
             <a:extLst>
               <a:ext uri="{FF2B5EF4-FFF2-40B4-BE49-F238E27FC236}">
-                <a16:creationId xmlns:a16="http://schemas.microsoft.com/office/drawing/2014/main" xmlns="" id="{0FD9900E-6167-466A-8343-3A6ED4548CF7}"/>
+                <a16:creationId xmlns="" xmlns:a16="http://schemas.microsoft.com/office/drawing/2014/main" id="{0FD9900E-6167-466A-8343-3A6ED4548CF7}"/>
               </a:ext>
             </a:extLst>
           </p:cNvPr>
@@ -11919,7 +11919,7 @@
           <p:cNvPr id="7" name="Foliennummernplatzhalter 6">
             <a:extLst>
               <a:ext uri="{FF2B5EF4-FFF2-40B4-BE49-F238E27FC236}">
-                <a16:creationId xmlns:a16="http://schemas.microsoft.com/office/drawing/2014/main" xmlns="" id="{6B270861-890E-4564-AF31-768B4DCCE22F}"/>
+                <a16:creationId xmlns="" xmlns:a16="http://schemas.microsoft.com/office/drawing/2014/main" id="{6B270861-890E-4564-AF31-768B4DCCE22F}"/>
               </a:ext>
             </a:extLst>
           </p:cNvPr>
@@ -12487,7 +12487,7 @@
           <p:cNvPr id="2" name="Titel 1">
             <a:extLst>
               <a:ext uri="{FF2B5EF4-FFF2-40B4-BE49-F238E27FC236}">
-                <a16:creationId xmlns:a16="http://schemas.microsoft.com/office/drawing/2014/main" xmlns="" id="{65B84212-09D1-4509-9353-ADC7BA7DA87C}"/>
+                <a16:creationId xmlns="" xmlns:a16="http://schemas.microsoft.com/office/drawing/2014/main" id="{65B84212-09D1-4509-9353-ADC7BA7DA87C}"/>
               </a:ext>
             </a:extLst>
           </p:cNvPr>
@@ -12515,7 +12515,7 @@
           <p:cNvPr id="3" name="Vertikaler Textplatzhalter 2">
             <a:extLst>
               <a:ext uri="{FF2B5EF4-FFF2-40B4-BE49-F238E27FC236}">
-                <a16:creationId xmlns:a16="http://schemas.microsoft.com/office/drawing/2014/main" xmlns="" id="{8F4924CF-B7F7-4306-A178-08A966433235}"/>
+                <a16:creationId xmlns="" xmlns:a16="http://schemas.microsoft.com/office/drawing/2014/main" id="{8F4924CF-B7F7-4306-A178-08A966433235}"/>
               </a:ext>
             </a:extLst>
           </p:cNvPr>
@@ -12572,7 +12572,7 @@
           <p:cNvPr id="4" name="Datumsplatzhalter 3">
             <a:extLst>
               <a:ext uri="{FF2B5EF4-FFF2-40B4-BE49-F238E27FC236}">
-                <a16:creationId xmlns:a16="http://schemas.microsoft.com/office/drawing/2014/main" xmlns="" id="{D09162EC-70D2-4064-9D17-E43D0B66AB15}"/>
+                <a16:creationId xmlns="" xmlns:a16="http://schemas.microsoft.com/office/drawing/2014/main" id="{D09162EC-70D2-4064-9D17-E43D0B66AB15}"/>
               </a:ext>
             </a:extLst>
           </p:cNvPr>
@@ -12596,7 +12596,7 @@
                   </a:prstClr>
                 </a:solidFill>
               </a:rPr>
-              <a:t>12.09.2017</a:t>
+              <a:t>13.09.2017</a:t>
             </a:fld>
             <a:endParaRPr lang="de-DE">
               <a:solidFill>
@@ -12613,7 +12613,7 @@
           <p:cNvPr id="5" name="Fußzeilenplatzhalter 4">
             <a:extLst>
               <a:ext uri="{FF2B5EF4-FFF2-40B4-BE49-F238E27FC236}">
-                <a16:creationId xmlns:a16="http://schemas.microsoft.com/office/drawing/2014/main" xmlns="" id="{D4755F2A-7C65-45D1-A178-48C969CD9C25}"/>
+                <a16:creationId xmlns="" xmlns:a16="http://schemas.microsoft.com/office/drawing/2014/main" id="{D4755F2A-7C65-45D1-A178-48C969CD9C25}"/>
               </a:ext>
             </a:extLst>
           </p:cNvPr>
@@ -12654,7 +12654,7 @@
           <p:cNvPr id="6" name="Foliennummernplatzhalter 5">
             <a:extLst>
               <a:ext uri="{FF2B5EF4-FFF2-40B4-BE49-F238E27FC236}">
-                <a16:creationId xmlns:a16="http://schemas.microsoft.com/office/drawing/2014/main" xmlns="" id="{CAEB7D33-33CB-4797-B737-15909722646E}"/>
+                <a16:creationId xmlns="" xmlns:a16="http://schemas.microsoft.com/office/drawing/2014/main" id="{CAEB7D33-33CB-4797-B737-15909722646E}"/>
               </a:ext>
             </a:extLst>
           </p:cNvPr>
@@ -12726,7 +12726,7 @@
           <p:cNvPr id="2" name="Vertikaler Titel 1">
             <a:extLst>
               <a:ext uri="{FF2B5EF4-FFF2-40B4-BE49-F238E27FC236}">
-                <a16:creationId xmlns:a16="http://schemas.microsoft.com/office/drawing/2014/main" xmlns="" id="{EE96332C-B44E-46D2-99C6-C3DA800A9BDB}"/>
+                <a16:creationId xmlns="" xmlns:a16="http://schemas.microsoft.com/office/drawing/2014/main" id="{EE96332C-B44E-46D2-99C6-C3DA800A9BDB}"/>
               </a:ext>
             </a:extLst>
           </p:cNvPr>
@@ -12759,7 +12759,7 @@
           <p:cNvPr id="3" name="Vertikaler Textplatzhalter 2">
             <a:extLst>
               <a:ext uri="{FF2B5EF4-FFF2-40B4-BE49-F238E27FC236}">
-                <a16:creationId xmlns:a16="http://schemas.microsoft.com/office/drawing/2014/main" xmlns="" id="{12C0143B-88E3-494D-A148-91913934E5EB}"/>
+                <a16:creationId xmlns="" xmlns:a16="http://schemas.microsoft.com/office/drawing/2014/main" id="{12C0143B-88E3-494D-A148-91913934E5EB}"/>
               </a:ext>
             </a:extLst>
           </p:cNvPr>
@@ -12821,7 +12821,7 @@
           <p:cNvPr id="4" name="Datumsplatzhalter 3">
             <a:extLst>
               <a:ext uri="{FF2B5EF4-FFF2-40B4-BE49-F238E27FC236}">
-                <a16:creationId xmlns:a16="http://schemas.microsoft.com/office/drawing/2014/main" xmlns="" id="{F40E2C0A-E743-478F-ADB0-3D7669BE35CF}"/>
+                <a16:creationId xmlns="" xmlns:a16="http://schemas.microsoft.com/office/drawing/2014/main" id="{F40E2C0A-E743-478F-ADB0-3D7669BE35CF}"/>
               </a:ext>
             </a:extLst>
           </p:cNvPr>
@@ -12845,7 +12845,7 @@
                   </a:prstClr>
                 </a:solidFill>
               </a:rPr>
-              <a:t>12.09.2017</a:t>
+              <a:t>13.09.2017</a:t>
             </a:fld>
             <a:endParaRPr lang="de-DE">
               <a:solidFill>
@@ -12862,7 +12862,7 @@
           <p:cNvPr id="5" name="Fußzeilenplatzhalter 4">
             <a:extLst>
               <a:ext uri="{FF2B5EF4-FFF2-40B4-BE49-F238E27FC236}">
-                <a16:creationId xmlns:a16="http://schemas.microsoft.com/office/drawing/2014/main" xmlns="" id="{80E646D1-009B-4AB7-9FED-56FCFF8556DB}"/>
+                <a16:creationId xmlns="" xmlns:a16="http://schemas.microsoft.com/office/drawing/2014/main" id="{80E646D1-009B-4AB7-9FED-56FCFF8556DB}"/>
               </a:ext>
             </a:extLst>
           </p:cNvPr>
@@ -12903,7 +12903,7 @@
           <p:cNvPr id="6" name="Foliennummernplatzhalter 5">
             <a:extLst>
               <a:ext uri="{FF2B5EF4-FFF2-40B4-BE49-F238E27FC236}">
-                <a16:creationId xmlns:a16="http://schemas.microsoft.com/office/drawing/2014/main" xmlns="" id="{5CF0614C-DA10-4BAE-90AB-DC1D5523AE13}"/>
+                <a16:creationId xmlns="" xmlns:a16="http://schemas.microsoft.com/office/drawing/2014/main" id="{5CF0614C-DA10-4BAE-90AB-DC1D5523AE13}"/>
               </a:ext>
             </a:extLst>
           </p:cNvPr>
@@ -14850,7 +14850,7 @@
                   <a:srgbClr val="000000"/>
                 </a:solidFill>
               </a:rPr>
-              <a:t>12.09.2017</a:t>
+              <a:t>13.09.2017</a:t>
             </a:fld>
             <a:endParaRPr lang="en-US" dirty="0">
               <a:solidFill>
@@ -15262,7 +15262,7 @@
                   <a:srgbClr val="000000"/>
                 </a:solidFill>
               </a:rPr>
-              <a:t>12.09.2017</a:t>
+              <a:t>13.09.2017</a:t>
             </a:fld>
             <a:endParaRPr lang="en-US" dirty="0">
               <a:solidFill>
@@ -16616,7 +16616,7 @@
           <a:p>
             <a:fld id="{872ED022-A919-4E12-8F0C-6CBD3D593937}" type="datetime1">
               <a:rPr lang="de-DE" noProof="0" smtClean="0"/>
-              <a:t>12.09.2017</a:t>
+              <a:t>13.09.2017</a:t>
             </a:fld>
             <a:endParaRPr lang="de-DE" noProof="0"/>
           </a:p>
@@ -17062,7 +17062,7 @@
                   <a:srgbClr val="000000"/>
                 </a:solidFill>
               </a:rPr>
-              <a:t>12.09.2017</a:t>
+              <a:t>13.09.2017</a:t>
             </a:fld>
             <a:endParaRPr lang="de-DE" dirty="0">
               <a:solidFill>
@@ -17555,7 +17555,7 @@
           <p:cNvPr id="2" name="Titelplatzhalter 1">
             <a:extLst>
               <a:ext uri="{FF2B5EF4-FFF2-40B4-BE49-F238E27FC236}">
-                <a16:creationId xmlns:a16="http://schemas.microsoft.com/office/drawing/2014/main" xmlns="" id="{BD76D2F4-AB0E-4003-BEC5-6233DEAE2EE3}"/>
+                <a16:creationId xmlns="" xmlns:a16="http://schemas.microsoft.com/office/drawing/2014/main" id="{BD76D2F4-AB0E-4003-BEC5-6233DEAE2EE3}"/>
               </a:ext>
             </a:extLst>
           </p:cNvPr>
@@ -17593,7 +17593,7 @@
           <p:cNvPr id="3" name="Textplatzhalter 2">
             <a:extLst>
               <a:ext uri="{FF2B5EF4-FFF2-40B4-BE49-F238E27FC236}">
-                <a16:creationId xmlns:a16="http://schemas.microsoft.com/office/drawing/2014/main" xmlns="" id="{B3DF9D16-F525-48A0-B6BF-34F51C606548}"/>
+                <a16:creationId xmlns="" xmlns:a16="http://schemas.microsoft.com/office/drawing/2014/main" id="{B3DF9D16-F525-48A0-B6BF-34F51C606548}"/>
               </a:ext>
             </a:extLst>
           </p:cNvPr>
@@ -17660,7 +17660,7 @@
           <p:cNvPr id="4" name="Datumsplatzhalter 3">
             <a:extLst>
               <a:ext uri="{FF2B5EF4-FFF2-40B4-BE49-F238E27FC236}">
-                <a16:creationId xmlns:a16="http://schemas.microsoft.com/office/drawing/2014/main" xmlns="" id="{35D46495-69C0-4970-9B93-B0D3A313D663}"/>
+                <a16:creationId xmlns="" xmlns:a16="http://schemas.microsoft.com/office/drawing/2014/main" id="{35D46495-69C0-4970-9B93-B0D3A313D663}"/>
               </a:ext>
             </a:extLst>
           </p:cNvPr>
@@ -17703,7 +17703,7 @@
                   </a:prstClr>
                 </a:solidFill>
               </a:rPr>
-              <a:t>12.09.2017</a:t>
+              <a:t>13.09.2017</a:t>
             </a:fld>
             <a:endParaRPr lang="de-DE">
               <a:solidFill>
@@ -17720,7 +17720,7 @@
           <p:cNvPr id="5" name="Fußzeilenplatzhalter 4">
             <a:extLst>
               <a:ext uri="{FF2B5EF4-FFF2-40B4-BE49-F238E27FC236}">
-                <a16:creationId xmlns:a16="http://schemas.microsoft.com/office/drawing/2014/main" xmlns="" id="{E70F8F24-E065-4612-AD81-C0A43872EFA7}"/>
+                <a16:creationId xmlns="" xmlns:a16="http://schemas.microsoft.com/office/drawing/2014/main" id="{E70F8F24-E065-4612-AD81-C0A43872EFA7}"/>
               </a:ext>
             </a:extLst>
           </p:cNvPr>
@@ -17780,7 +17780,7 @@
           <p:cNvPr id="6" name="Foliennummernplatzhalter 5">
             <a:extLst>
               <a:ext uri="{FF2B5EF4-FFF2-40B4-BE49-F238E27FC236}">
-                <a16:creationId xmlns:a16="http://schemas.microsoft.com/office/drawing/2014/main" xmlns="" id="{FE567765-8802-4837-ABFA-B703E3FF1D7A}"/>
+                <a16:creationId xmlns="" xmlns:a16="http://schemas.microsoft.com/office/drawing/2014/main" id="{FE567765-8802-4837-ABFA-B703E3FF1D7A}"/>
               </a:ext>
             </a:extLst>
           </p:cNvPr>
@@ -18430,7 +18430,7 @@
                   <a:srgbClr val="000000"/>
                 </a:solidFill>
               </a:rPr>
-              <a:t>12.09.2017</a:t>
+              <a:t>13.09.2017</a:t>
             </a:fld>
             <a:endParaRPr lang="en-US" dirty="0">
               <a:solidFill>
@@ -18577,11 +18577,7 @@
             </a:r>
             <a:r>
               <a:rPr lang="de-DE" dirty="0" smtClean="0"/>
-              <a:t>ocket </a:t>
-            </a:r>
-            <a:r>
-              <a:rPr lang="de-DE" dirty="0" smtClean="0"/>
-              <a:t>aufgebaut werden soll</a:t>
+              <a:t>ocket aufgebaut werden soll</a:t>
             </a:r>
           </a:p>
           <a:p>
@@ -18609,13 +18605,8 @@
             <a:pPr lvl="1"/>
             <a:r>
               <a:rPr lang="de-DE" dirty="0" smtClean="0"/>
-              <a:t>Sinnvoller Ablauf für die Kommunikation mit </a:t>
-            </a:r>
-            <a:r>
-              <a:rPr lang="de-DE" dirty="0" smtClean="0"/>
-              <a:t>Objekten</a:t>
-            </a:r>
-            <a:endParaRPr lang="de-DE" dirty="0" smtClean="0"/>
+              <a:t>Sinnvoller Ablauf für die Kommunikation mit Objekten</a:t>
+            </a:r>
           </a:p>
           <a:p>
             <a:endParaRPr lang="de-DE" dirty="0"/>
@@ -18726,7 +18717,7 @@
                   <a:srgbClr val="000000"/>
                 </a:solidFill>
               </a:rPr>
-              <a:t>12.09.2017</a:t>
+              <a:t>13.09.2017</a:t>
             </a:fld>
             <a:endParaRPr lang="en-US" dirty="0">
               <a:solidFill>
@@ -21029,7 +21020,7 @@
                   </a:prstClr>
                 </a:solidFill>
               </a:rPr>
-              <a:t>12.09.2017</a:t>
+              <a:t>13.09.2017</a:t>
             </a:fld>
             <a:endParaRPr lang="de-DE" dirty="0">
               <a:solidFill>
@@ -21258,7 +21249,7 @@
                   <a:srgbClr val="000000"/>
                 </a:solidFill>
               </a:rPr>
-              <a:t>12.09.2017</a:t>
+              <a:t>13.09.2017</a:t>
             </a:fld>
             <a:endParaRPr lang="en-US" dirty="0">
               <a:solidFill>
@@ -21403,10 +21394,6 @@
               <a:rPr lang="en-US" dirty="0" smtClean="0"/>
               <a:t>?</a:t>
             </a:r>
-            <a:r>
-              <a:rPr lang="en-US" dirty="0" smtClean="0"/>
-              <a:t/>
-            </a:r>
             <a:br>
               <a:rPr lang="en-US" dirty="0" smtClean="0"/>
             </a:br>
@@ -21511,7 +21498,7 @@
           <a:p>
             <a:fld id="{42362027-910C-420C-A626-9656762241F4}" type="datetime1">
               <a:rPr lang="de-DE" noProof="0" smtClean="0"/>
-              <a:t>12.09.2017</a:t>
+              <a:t>13.09.2017</a:t>
             </a:fld>
             <a:endParaRPr lang="en-US" noProof="0"/>
           </a:p>
@@ -21592,7 +21579,7 @@
           <a:p>
             <a:fld id="{D01F4938-0F46-45E6-A271-27A71E4ADECE}" type="datetime1">
               <a:rPr lang="de-DE" noProof="0" smtClean="0"/>
-              <a:t>12.09.2017</a:t>
+              <a:t>13.09.2017</a:t>
             </a:fld>
             <a:endParaRPr lang="en-US" noProof="0"/>
           </a:p>
@@ -22277,6 +22264,13 @@
   <p:transition>
     <p:fade/>
   </p:transition>
+  <p:timing>
+    <p:tnLst>
+      <p:par>
+        <p:cTn id="1" dur="indefinite" restart="never" nodeType="tmRoot"/>
+      </p:par>
+    </p:tnLst>
+  </p:timing>
 </p:sld>
 </file>
 
@@ -22314,11 +22308,7 @@
           <a:p>
             <a:r>
               <a:rPr lang="de-DE" dirty="0" smtClean="0"/>
-              <a:t>Leitung: Christian </a:t>
-            </a:r>
-            <a:r>
-              <a:rPr lang="de-DE" dirty="0" smtClean="0"/>
-              <a:t>Hopp</a:t>
+              <a:t>Leitung: Christian Hopp</a:t>
             </a:r>
           </a:p>
           <a:p>
@@ -22326,7 +22316,6 @@
               <a:rPr lang="de-DE" dirty="0" smtClean="0"/>
               <a:t>GIT-Hub: Nicolas Diehl</a:t>
             </a:r>
-            <a:endParaRPr lang="de-DE" dirty="0" smtClean="0"/>
           </a:p>
           <a:p>
             <a:r>
@@ -22339,8 +22328,19 @@
             </a:r>
             <a:r>
               <a:rPr lang="de-DE" dirty="0" smtClean="0"/>
-              <a:t>, Andreas Klamm, Charles Anthony</a:t>
-            </a:r>
+              <a:t>, Andreas Klamm, Charles </a:t>
+            </a:r>
+            <a:r>
+              <a:rPr lang="de-DE" dirty="0" smtClean="0"/>
+              <a:t>Anthony</a:t>
+            </a:r>
+          </a:p>
+          <a:p>
+            <a:r>
+              <a:rPr lang="de-DE" dirty="0" smtClean="0"/>
+              <a:t>XML: Norman Dettmer</a:t>
+            </a:r>
+            <a:endParaRPr lang="de-DE" dirty="0" smtClean="0"/>
           </a:p>
           <a:p>
             <a:r>
@@ -22385,11 +22385,7 @@
             <a:pPr lvl="1"/>
             <a:r>
               <a:rPr lang="de-DE" dirty="0" smtClean="0"/>
-              <a:t>LDAP/ User: Florian Braun, Deniz </a:t>
-            </a:r>
-            <a:r>
-              <a:rPr lang="de-DE" dirty="0" smtClean="0"/>
-              <a:t>Hug</a:t>
+              <a:t>LDAP/ User: Florian Braun, Deniz Hug</a:t>
             </a:r>
             <a:endParaRPr lang="de-DE" dirty="0"/>
           </a:p>
@@ -22448,7 +22444,7 @@
                   <a:srgbClr val="000000"/>
                 </a:solidFill>
               </a:rPr>
-              <a:t>12.09.2017</a:t>
+              <a:t>13.09.2017</a:t>
             </a:fld>
             <a:endParaRPr lang="en-US" dirty="0">
               <a:solidFill>
@@ -22578,7 +22574,7 @@
           <a:p>
             <a:fld id="{D01F4938-0F46-45E6-A271-27A71E4ADECE}" type="datetime1">
               <a:rPr lang="de-DE" noProof="0" smtClean="0"/>
-              <a:t>12.09.2017</a:t>
+              <a:t>13.09.2017</a:t>
             </a:fld>
             <a:endParaRPr lang="en-US" noProof="0"/>
           </a:p>
@@ -23487,6 +23483,13 @@
   <p:transition>
     <p:fade/>
   </p:transition>
+  <p:timing>
+    <p:tnLst>
+      <p:par>
+        <p:cTn id="1" dur="indefinite" restart="never" nodeType="tmRoot"/>
+      </p:par>
+    </p:tnLst>
+  </p:timing>
 </p:sld>
 </file>
 
@@ -23614,7 +23617,7 @@
                   <a:srgbClr val="000000"/>
                 </a:solidFill>
               </a:rPr>
-              <a:t>12.09.2017</a:t>
+              <a:t>13.09.2017</a:t>
             </a:fld>
             <a:endParaRPr lang="en-US" dirty="0">
               <a:solidFill>
@@ -23816,7 +23819,7 @@
                   <a:srgbClr val="000000"/>
                 </a:solidFill>
               </a:rPr>
-              <a:t>12.09.2017</a:t>
+              <a:t>13.09.2017</a:t>
             </a:fld>
             <a:endParaRPr lang="en-US" dirty="0">
               <a:solidFill>
@@ -23946,7 +23949,7 @@
           <a:p>
             <a:fld id="{D01F4938-0F46-45E6-A271-27A71E4ADECE}" type="datetime1">
               <a:rPr lang="de-DE" noProof="0" smtClean="0"/>
-              <a:t>12.09.2017</a:t>
+              <a:t>13.09.2017</a:t>
             </a:fld>
             <a:endParaRPr lang="en-US" noProof="0"/>
           </a:p>
@@ -25196,6 +25199,13 @@
   <p:transition>
     <p:fade/>
   </p:transition>
+  <p:timing>
+    <p:tnLst>
+      <p:par>
+        <p:cTn id="1" dur="indefinite" restart="never" nodeType="tmRoot"/>
+      </p:par>
+    </p:tnLst>
+  </p:timing>
 </p:sld>
 </file>
 
@@ -25339,7 +25349,7 @@
                   <a:srgbClr val="000000"/>
                 </a:solidFill>
               </a:rPr>
-              <a:t>12.09.2017</a:t>
+              <a:t>13.09.2017</a:t>
             </a:fld>
             <a:endParaRPr lang="en-US" dirty="0">
               <a:solidFill>
@@ -25550,11 +25560,7 @@
             </a:r>
             <a:r>
               <a:rPr lang="de-DE" dirty="0" smtClean="0"/>
-              <a:t>LDAP / </a:t>
-            </a:r>
-            <a:r>
-              <a:rPr lang="de-DE" dirty="0" smtClean="0"/>
-              <a:t>User-Klasse</a:t>
+              <a:t>LDAP / User-Klasse</a:t>
             </a:r>
             <a:endParaRPr lang="de-DE" dirty="0"/>
           </a:p>
@@ -25581,7 +25587,7 @@
                   <a:srgbClr val="000000"/>
                 </a:solidFill>
               </a:rPr>
-              <a:t>12.09.2017</a:t>
+              <a:t>13.09.2017</a:t>
             </a:fld>
             <a:endParaRPr lang="en-US" dirty="0">
               <a:solidFill>

</xml_diff>

<commit_message>
Fehler aus Präsi angepasst
</commit_message>
<xml_diff>
--- a/Documentation/Präsentation.pptx
+++ b/Documentation/Präsentation.pptx
@@ -9399,7 +9399,7 @@
           <p:cNvPr id="2" name="Titel 1">
             <a:extLst>
               <a:ext uri="{FF2B5EF4-FFF2-40B4-BE49-F238E27FC236}">
-                <a16:creationId xmlns="" xmlns:a16="http://schemas.microsoft.com/office/drawing/2014/main" id="{B548D912-5D5D-404C-9197-3F32C97A23B1}"/>
+                <a16:creationId xmlns:a16="http://schemas.microsoft.com/office/drawing/2014/main" xmlns="" id="{B548D912-5D5D-404C-9197-3F32C97A23B1}"/>
               </a:ext>
             </a:extLst>
           </p:cNvPr>
@@ -9436,7 +9436,7 @@
           <p:cNvPr id="3" name="Untertitel 2">
             <a:extLst>
               <a:ext uri="{FF2B5EF4-FFF2-40B4-BE49-F238E27FC236}">
-                <a16:creationId xmlns="" xmlns:a16="http://schemas.microsoft.com/office/drawing/2014/main" id="{A7A859B5-DAA5-4171-A412-67E4CC691171}"/>
+                <a16:creationId xmlns:a16="http://schemas.microsoft.com/office/drawing/2014/main" xmlns="" id="{A7A859B5-DAA5-4171-A412-67E4CC691171}"/>
               </a:ext>
             </a:extLst>
           </p:cNvPr>
@@ -9506,7 +9506,7 @@
           <p:cNvPr id="4" name="Datumsplatzhalter 3">
             <a:extLst>
               <a:ext uri="{FF2B5EF4-FFF2-40B4-BE49-F238E27FC236}">
-                <a16:creationId xmlns="" xmlns:a16="http://schemas.microsoft.com/office/drawing/2014/main" id="{8ACF4445-647E-4F40-BEAE-95DD88A77411}"/>
+                <a16:creationId xmlns:a16="http://schemas.microsoft.com/office/drawing/2014/main" xmlns="" id="{8ACF4445-647E-4F40-BEAE-95DD88A77411}"/>
               </a:ext>
             </a:extLst>
           </p:cNvPr>
@@ -9547,7 +9547,7 @@
           <p:cNvPr id="5" name="Fußzeilenplatzhalter 4">
             <a:extLst>
               <a:ext uri="{FF2B5EF4-FFF2-40B4-BE49-F238E27FC236}">
-                <a16:creationId xmlns="" xmlns:a16="http://schemas.microsoft.com/office/drawing/2014/main" id="{79398AE5-DBDA-4F41-B808-6DB700D84598}"/>
+                <a16:creationId xmlns:a16="http://schemas.microsoft.com/office/drawing/2014/main" xmlns="" id="{79398AE5-DBDA-4F41-B808-6DB700D84598}"/>
               </a:ext>
             </a:extLst>
           </p:cNvPr>
@@ -9588,7 +9588,7 @@
           <p:cNvPr id="6" name="Foliennummernplatzhalter 5">
             <a:extLst>
               <a:ext uri="{FF2B5EF4-FFF2-40B4-BE49-F238E27FC236}">
-                <a16:creationId xmlns="" xmlns:a16="http://schemas.microsoft.com/office/drawing/2014/main" id="{783C2E31-C455-4E63-A969-188015F5CC2E}"/>
+                <a16:creationId xmlns:a16="http://schemas.microsoft.com/office/drawing/2014/main" xmlns="" id="{783C2E31-C455-4E63-A969-188015F5CC2E}"/>
               </a:ext>
             </a:extLst>
           </p:cNvPr>
@@ -9660,7 +9660,7 @@
           <p:cNvPr id="2" name="Titel 1">
             <a:extLst>
               <a:ext uri="{FF2B5EF4-FFF2-40B4-BE49-F238E27FC236}">
-                <a16:creationId xmlns="" xmlns:a16="http://schemas.microsoft.com/office/drawing/2014/main" id="{0C18661C-E030-40E5-90E5-EBF98E2930FC}"/>
+                <a16:creationId xmlns:a16="http://schemas.microsoft.com/office/drawing/2014/main" xmlns="" id="{0C18661C-E030-40E5-90E5-EBF98E2930FC}"/>
               </a:ext>
             </a:extLst>
           </p:cNvPr>
@@ -9688,7 +9688,7 @@
           <p:cNvPr id="3" name="Inhaltsplatzhalter 2">
             <a:extLst>
               <a:ext uri="{FF2B5EF4-FFF2-40B4-BE49-F238E27FC236}">
-                <a16:creationId xmlns="" xmlns:a16="http://schemas.microsoft.com/office/drawing/2014/main" id="{C70E25F6-48F8-4C6E-88BB-6FFA6E756793}"/>
+                <a16:creationId xmlns:a16="http://schemas.microsoft.com/office/drawing/2014/main" xmlns="" id="{C70E25F6-48F8-4C6E-88BB-6FFA6E756793}"/>
               </a:ext>
             </a:extLst>
           </p:cNvPr>
@@ -9745,7 +9745,7 @@
           <p:cNvPr id="4" name="Datumsplatzhalter 3">
             <a:extLst>
               <a:ext uri="{FF2B5EF4-FFF2-40B4-BE49-F238E27FC236}">
-                <a16:creationId xmlns="" xmlns:a16="http://schemas.microsoft.com/office/drawing/2014/main" id="{DCC231CB-233E-4E75-947B-08381C778EF7}"/>
+                <a16:creationId xmlns:a16="http://schemas.microsoft.com/office/drawing/2014/main" xmlns="" id="{DCC231CB-233E-4E75-947B-08381C778EF7}"/>
               </a:ext>
             </a:extLst>
           </p:cNvPr>
@@ -9786,7 +9786,7 @@
           <p:cNvPr id="5" name="Fußzeilenplatzhalter 4">
             <a:extLst>
               <a:ext uri="{FF2B5EF4-FFF2-40B4-BE49-F238E27FC236}">
-                <a16:creationId xmlns="" xmlns:a16="http://schemas.microsoft.com/office/drawing/2014/main" id="{5DB103C3-CDCB-416C-85C6-B0A72C8E2547}"/>
+                <a16:creationId xmlns:a16="http://schemas.microsoft.com/office/drawing/2014/main" xmlns="" id="{5DB103C3-CDCB-416C-85C6-B0A72C8E2547}"/>
               </a:ext>
             </a:extLst>
           </p:cNvPr>
@@ -9827,7 +9827,7 @@
           <p:cNvPr id="6" name="Foliennummernplatzhalter 5">
             <a:extLst>
               <a:ext uri="{FF2B5EF4-FFF2-40B4-BE49-F238E27FC236}">
-                <a16:creationId xmlns="" xmlns:a16="http://schemas.microsoft.com/office/drawing/2014/main" id="{F91E8D97-F3C4-4C7B-9B95-0422049F8E07}"/>
+                <a16:creationId xmlns:a16="http://schemas.microsoft.com/office/drawing/2014/main" xmlns="" id="{F91E8D97-F3C4-4C7B-9B95-0422049F8E07}"/>
               </a:ext>
             </a:extLst>
           </p:cNvPr>
@@ -9899,7 +9899,7 @@
           <p:cNvPr id="2" name="Titel 1">
             <a:extLst>
               <a:ext uri="{FF2B5EF4-FFF2-40B4-BE49-F238E27FC236}">
-                <a16:creationId xmlns="" xmlns:a16="http://schemas.microsoft.com/office/drawing/2014/main" id="{27E3C20D-4436-47B6-990D-85C4CCAA8294}"/>
+                <a16:creationId xmlns:a16="http://schemas.microsoft.com/office/drawing/2014/main" xmlns="" id="{27E3C20D-4436-47B6-990D-85C4CCAA8294}"/>
               </a:ext>
             </a:extLst>
           </p:cNvPr>
@@ -9936,7 +9936,7 @@
           <p:cNvPr id="3" name="Textplatzhalter 2">
             <a:extLst>
               <a:ext uri="{FF2B5EF4-FFF2-40B4-BE49-F238E27FC236}">
-                <a16:creationId xmlns="" xmlns:a16="http://schemas.microsoft.com/office/drawing/2014/main" id="{BA8FEB50-313F-4EFD-8234-33A16010AC7E}"/>
+                <a16:creationId xmlns:a16="http://schemas.microsoft.com/office/drawing/2014/main" xmlns="" id="{BA8FEB50-313F-4EFD-8234-33A16010AC7E}"/>
               </a:ext>
             </a:extLst>
           </p:cNvPr>
@@ -10061,7 +10061,7 @@
           <p:cNvPr id="4" name="Datumsplatzhalter 3">
             <a:extLst>
               <a:ext uri="{FF2B5EF4-FFF2-40B4-BE49-F238E27FC236}">
-                <a16:creationId xmlns="" xmlns:a16="http://schemas.microsoft.com/office/drawing/2014/main" id="{ADE1F284-5EED-41D1-92A7-E0910D7CA876}"/>
+                <a16:creationId xmlns:a16="http://schemas.microsoft.com/office/drawing/2014/main" xmlns="" id="{ADE1F284-5EED-41D1-92A7-E0910D7CA876}"/>
               </a:ext>
             </a:extLst>
           </p:cNvPr>
@@ -10102,7 +10102,7 @@
           <p:cNvPr id="5" name="Fußzeilenplatzhalter 4">
             <a:extLst>
               <a:ext uri="{FF2B5EF4-FFF2-40B4-BE49-F238E27FC236}">
-                <a16:creationId xmlns="" xmlns:a16="http://schemas.microsoft.com/office/drawing/2014/main" id="{1F527557-1771-402E-A145-C311ED579013}"/>
+                <a16:creationId xmlns:a16="http://schemas.microsoft.com/office/drawing/2014/main" xmlns="" id="{1F527557-1771-402E-A145-C311ED579013}"/>
               </a:ext>
             </a:extLst>
           </p:cNvPr>
@@ -10143,7 +10143,7 @@
           <p:cNvPr id="6" name="Foliennummernplatzhalter 5">
             <a:extLst>
               <a:ext uri="{FF2B5EF4-FFF2-40B4-BE49-F238E27FC236}">
-                <a16:creationId xmlns="" xmlns:a16="http://schemas.microsoft.com/office/drawing/2014/main" id="{1DB1DDD4-68BD-480F-A9AA-E99BE0B93A70}"/>
+                <a16:creationId xmlns:a16="http://schemas.microsoft.com/office/drawing/2014/main" xmlns="" id="{1DB1DDD4-68BD-480F-A9AA-E99BE0B93A70}"/>
               </a:ext>
             </a:extLst>
           </p:cNvPr>
@@ -10215,7 +10215,7 @@
           <p:cNvPr id="2" name="Titel 1">
             <a:extLst>
               <a:ext uri="{FF2B5EF4-FFF2-40B4-BE49-F238E27FC236}">
-                <a16:creationId xmlns="" xmlns:a16="http://schemas.microsoft.com/office/drawing/2014/main" id="{4552CB55-2539-4426-BF73-4DA552452622}"/>
+                <a16:creationId xmlns:a16="http://schemas.microsoft.com/office/drawing/2014/main" xmlns="" id="{4552CB55-2539-4426-BF73-4DA552452622}"/>
               </a:ext>
             </a:extLst>
           </p:cNvPr>
@@ -10243,7 +10243,7 @@
           <p:cNvPr id="3" name="Inhaltsplatzhalter 2">
             <a:extLst>
               <a:ext uri="{FF2B5EF4-FFF2-40B4-BE49-F238E27FC236}">
-                <a16:creationId xmlns="" xmlns:a16="http://schemas.microsoft.com/office/drawing/2014/main" id="{B3AA64D0-2391-4A9E-82EB-43AD0B41E8D4}"/>
+                <a16:creationId xmlns:a16="http://schemas.microsoft.com/office/drawing/2014/main" xmlns="" id="{B3AA64D0-2391-4A9E-82EB-43AD0B41E8D4}"/>
               </a:ext>
             </a:extLst>
           </p:cNvPr>
@@ -10305,7 +10305,7 @@
           <p:cNvPr id="4" name="Inhaltsplatzhalter 3">
             <a:extLst>
               <a:ext uri="{FF2B5EF4-FFF2-40B4-BE49-F238E27FC236}">
-                <a16:creationId xmlns="" xmlns:a16="http://schemas.microsoft.com/office/drawing/2014/main" id="{6E7A1C1B-44AE-4A30-8E85-FC486FE5F25E}"/>
+                <a16:creationId xmlns:a16="http://schemas.microsoft.com/office/drawing/2014/main" xmlns="" id="{6E7A1C1B-44AE-4A30-8E85-FC486FE5F25E}"/>
               </a:ext>
             </a:extLst>
           </p:cNvPr>
@@ -10367,7 +10367,7 @@
           <p:cNvPr id="5" name="Datumsplatzhalter 4">
             <a:extLst>
               <a:ext uri="{FF2B5EF4-FFF2-40B4-BE49-F238E27FC236}">
-                <a16:creationId xmlns="" xmlns:a16="http://schemas.microsoft.com/office/drawing/2014/main" id="{27F680E6-8A42-40A3-9991-7117B7753D2D}"/>
+                <a16:creationId xmlns:a16="http://schemas.microsoft.com/office/drawing/2014/main" xmlns="" id="{27F680E6-8A42-40A3-9991-7117B7753D2D}"/>
               </a:ext>
             </a:extLst>
           </p:cNvPr>
@@ -10408,7 +10408,7 @@
           <p:cNvPr id="6" name="Fußzeilenplatzhalter 5">
             <a:extLst>
               <a:ext uri="{FF2B5EF4-FFF2-40B4-BE49-F238E27FC236}">
-                <a16:creationId xmlns="" xmlns:a16="http://schemas.microsoft.com/office/drawing/2014/main" id="{96B21538-DB3F-48D6-B437-C34EA1559EE4}"/>
+                <a16:creationId xmlns:a16="http://schemas.microsoft.com/office/drawing/2014/main" xmlns="" id="{96B21538-DB3F-48D6-B437-C34EA1559EE4}"/>
               </a:ext>
             </a:extLst>
           </p:cNvPr>
@@ -10449,7 +10449,7 @@
           <p:cNvPr id="7" name="Foliennummernplatzhalter 6">
             <a:extLst>
               <a:ext uri="{FF2B5EF4-FFF2-40B4-BE49-F238E27FC236}">
-                <a16:creationId xmlns="" xmlns:a16="http://schemas.microsoft.com/office/drawing/2014/main" id="{694EC2F0-469C-465E-A12C-161DB035E8EC}"/>
+                <a16:creationId xmlns:a16="http://schemas.microsoft.com/office/drawing/2014/main" xmlns="" id="{694EC2F0-469C-465E-A12C-161DB035E8EC}"/>
               </a:ext>
             </a:extLst>
           </p:cNvPr>
@@ -10521,7 +10521,7 @@
           <p:cNvPr id="2" name="Titel 1">
             <a:extLst>
               <a:ext uri="{FF2B5EF4-FFF2-40B4-BE49-F238E27FC236}">
-                <a16:creationId xmlns="" xmlns:a16="http://schemas.microsoft.com/office/drawing/2014/main" id="{BCB5056A-F3D6-41EF-9BCB-26C0B9571FA2}"/>
+                <a16:creationId xmlns:a16="http://schemas.microsoft.com/office/drawing/2014/main" xmlns="" id="{BCB5056A-F3D6-41EF-9BCB-26C0B9571FA2}"/>
               </a:ext>
             </a:extLst>
           </p:cNvPr>
@@ -10554,7 +10554,7 @@
           <p:cNvPr id="3" name="Textplatzhalter 2">
             <a:extLst>
               <a:ext uri="{FF2B5EF4-FFF2-40B4-BE49-F238E27FC236}">
-                <a16:creationId xmlns="" xmlns:a16="http://schemas.microsoft.com/office/drawing/2014/main" id="{D9DDA0CF-116F-4EC7-A2D2-8351B0504DEC}"/>
+                <a16:creationId xmlns:a16="http://schemas.microsoft.com/office/drawing/2014/main" xmlns="" id="{D9DDA0CF-116F-4EC7-A2D2-8351B0504DEC}"/>
               </a:ext>
             </a:extLst>
           </p:cNvPr>
@@ -10625,7 +10625,7 @@
           <p:cNvPr id="4" name="Inhaltsplatzhalter 3">
             <a:extLst>
               <a:ext uri="{FF2B5EF4-FFF2-40B4-BE49-F238E27FC236}">
-                <a16:creationId xmlns="" xmlns:a16="http://schemas.microsoft.com/office/drawing/2014/main" id="{0DEC7B34-53E2-42E8-AE4A-89254BDE99E7}"/>
+                <a16:creationId xmlns:a16="http://schemas.microsoft.com/office/drawing/2014/main" xmlns="" id="{0DEC7B34-53E2-42E8-AE4A-89254BDE99E7}"/>
               </a:ext>
             </a:extLst>
           </p:cNvPr>
@@ -10687,7 +10687,7 @@
           <p:cNvPr id="5" name="Textplatzhalter 4">
             <a:extLst>
               <a:ext uri="{FF2B5EF4-FFF2-40B4-BE49-F238E27FC236}">
-                <a16:creationId xmlns="" xmlns:a16="http://schemas.microsoft.com/office/drawing/2014/main" id="{89A4D379-119F-47DA-8EF5-EE05FFE8286A}"/>
+                <a16:creationId xmlns:a16="http://schemas.microsoft.com/office/drawing/2014/main" xmlns="" id="{89A4D379-119F-47DA-8EF5-EE05FFE8286A}"/>
               </a:ext>
             </a:extLst>
           </p:cNvPr>
@@ -10758,7 +10758,7 @@
           <p:cNvPr id="6" name="Inhaltsplatzhalter 5">
             <a:extLst>
               <a:ext uri="{FF2B5EF4-FFF2-40B4-BE49-F238E27FC236}">
-                <a16:creationId xmlns="" xmlns:a16="http://schemas.microsoft.com/office/drawing/2014/main" id="{941F8921-80F6-4A06-9D2E-52ACF05CBAB7}"/>
+                <a16:creationId xmlns:a16="http://schemas.microsoft.com/office/drawing/2014/main" xmlns="" id="{941F8921-80F6-4A06-9D2E-52ACF05CBAB7}"/>
               </a:ext>
             </a:extLst>
           </p:cNvPr>
@@ -10820,7 +10820,7 @@
           <p:cNvPr id="7" name="Datumsplatzhalter 6">
             <a:extLst>
               <a:ext uri="{FF2B5EF4-FFF2-40B4-BE49-F238E27FC236}">
-                <a16:creationId xmlns="" xmlns:a16="http://schemas.microsoft.com/office/drawing/2014/main" id="{BF404AF3-4542-4601-967D-E7DD05B89C18}"/>
+                <a16:creationId xmlns:a16="http://schemas.microsoft.com/office/drawing/2014/main" xmlns="" id="{BF404AF3-4542-4601-967D-E7DD05B89C18}"/>
               </a:ext>
             </a:extLst>
           </p:cNvPr>
@@ -10861,7 +10861,7 @@
           <p:cNvPr id="8" name="Fußzeilenplatzhalter 7">
             <a:extLst>
               <a:ext uri="{FF2B5EF4-FFF2-40B4-BE49-F238E27FC236}">
-                <a16:creationId xmlns="" xmlns:a16="http://schemas.microsoft.com/office/drawing/2014/main" id="{265C0515-770F-44A3-9693-DE4F0FA5591D}"/>
+                <a16:creationId xmlns:a16="http://schemas.microsoft.com/office/drawing/2014/main" xmlns="" id="{265C0515-770F-44A3-9693-DE4F0FA5591D}"/>
               </a:ext>
             </a:extLst>
           </p:cNvPr>
@@ -10902,7 +10902,7 @@
           <p:cNvPr id="9" name="Foliennummernplatzhalter 8">
             <a:extLst>
               <a:ext uri="{FF2B5EF4-FFF2-40B4-BE49-F238E27FC236}">
-                <a16:creationId xmlns="" xmlns:a16="http://schemas.microsoft.com/office/drawing/2014/main" id="{44E0BD46-8DB3-49A2-8422-30252E46D3F0}"/>
+                <a16:creationId xmlns:a16="http://schemas.microsoft.com/office/drawing/2014/main" xmlns="" id="{44E0BD46-8DB3-49A2-8422-30252E46D3F0}"/>
               </a:ext>
             </a:extLst>
           </p:cNvPr>
@@ -10974,7 +10974,7 @@
           <p:cNvPr id="2" name="Titel 1">
             <a:extLst>
               <a:ext uri="{FF2B5EF4-FFF2-40B4-BE49-F238E27FC236}">
-                <a16:creationId xmlns="" xmlns:a16="http://schemas.microsoft.com/office/drawing/2014/main" id="{CC57E374-267D-44F2-9BA8-6557320D5097}"/>
+                <a16:creationId xmlns:a16="http://schemas.microsoft.com/office/drawing/2014/main" xmlns="" id="{CC57E374-267D-44F2-9BA8-6557320D5097}"/>
               </a:ext>
             </a:extLst>
           </p:cNvPr>
@@ -11002,7 +11002,7 @@
           <p:cNvPr id="3" name="Datumsplatzhalter 2">
             <a:extLst>
               <a:ext uri="{FF2B5EF4-FFF2-40B4-BE49-F238E27FC236}">
-                <a16:creationId xmlns="" xmlns:a16="http://schemas.microsoft.com/office/drawing/2014/main" id="{3BE0F40C-66C3-4C9F-BF02-1683CA0B2FA1}"/>
+                <a16:creationId xmlns:a16="http://schemas.microsoft.com/office/drawing/2014/main" xmlns="" id="{3BE0F40C-66C3-4C9F-BF02-1683CA0B2FA1}"/>
               </a:ext>
             </a:extLst>
           </p:cNvPr>
@@ -11043,7 +11043,7 @@
           <p:cNvPr id="4" name="Fußzeilenplatzhalter 3">
             <a:extLst>
               <a:ext uri="{FF2B5EF4-FFF2-40B4-BE49-F238E27FC236}">
-                <a16:creationId xmlns="" xmlns:a16="http://schemas.microsoft.com/office/drawing/2014/main" id="{C5263F7F-EC32-47BE-BE0A-0C25CDDE9162}"/>
+                <a16:creationId xmlns:a16="http://schemas.microsoft.com/office/drawing/2014/main" xmlns="" id="{C5263F7F-EC32-47BE-BE0A-0C25CDDE9162}"/>
               </a:ext>
             </a:extLst>
           </p:cNvPr>
@@ -11084,7 +11084,7 @@
           <p:cNvPr id="5" name="Foliennummernplatzhalter 4">
             <a:extLst>
               <a:ext uri="{FF2B5EF4-FFF2-40B4-BE49-F238E27FC236}">
-                <a16:creationId xmlns="" xmlns:a16="http://schemas.microsoft.com/office/drawing/2014/main" id="{5AEBBBC5-C01A-436D-B247-8AF2FA11F2BE}"/>
+                <a16:creationId xmlns:a16="http://schemas.microsoft.com/office/drawing/2014/main" xmlns="" id="{5AEBBBC5-C01A-436D-B247-8AF2FA11F2BE}"/>
               </a:ext>
             </a:extLst>
           </p:cNvPr>
@@ -11156,7 +11156,7 @@
           <p:cNvPr id="2" name="Datumsplatzhalter 1">
             <a:extLst>
               <a:ext uri="{FF2B5EF4-FFF2-40B4-BE49-F238E27FC236}">
-                <a16:creationId xmlns="" xmlns:a16="http://schemas.microsoft.com/office/drawing/2014/main" id="{DDCE00C2-04AB-4241-834D-BE064D7B64EE}"/>
+                <a16:creationId xmlns:a16="http://schemas.microsoft.com/office/drawing/2014/main" xmlns="" id="{DDCE00C2-04AB-4241-834D-BE064D7B64EE}"/>
               </a:ext>
             </a:extLst>
           </p:cNvPr>
@@ -11197,7 +11197,7 @@
           <p:cNvPr id="3" name="Fußzeilenplatzhalter 2">
             <a:extLst>
               <a:ext uri="{FF2B5EF4-FFF2-40B4-BE49-F238E27FC236}">
-                <a16:creationId xmlns="" xmlns:a16="http://schemas.microsoft.com/office/drawing/2014/main" id="{77C91F00-B34B-4654-B7F7-12BF99AB9B0E}"/>
+                <a16:creationId xmlns:a16="http://schemas.microsoft.com/office/drawing/2014/main" xmlns="" id="{77C91F00-B34B-4654-B7F7-12BF99AB9B0E}"/>
               </a:ext>
             </a:extLst>
           </p:cNvPr>
@@ -11238,7 +11238,7 @@
           <p:cNvPr id="4" name="Foliennummernplatzhalter 3">
             <a:extLst>
               <a:ext uri="{FF2B5EF4-FFF2-40B4-BE49-F238E27FC236}">
-                <a16:creationId xmlns="" xmlns:a16="http://schemas.microsoft.com/office/drawing/2014/main" id="{699091F1-2F2C-42EF-8F1F-CA076A6180F0}"/>
+                <a16:creationId xmlns:a16="http://schemas.microsoft.com/office/drawing/2014/main" xmlns="" id="{699091F1-2F2C-42EF-8F1F-CA076A6180F0}"/>
               </a:ext>
             </a:extLst>
           </p:cNvPr>
@@ -11310,7 +11310,7 @@
           <p:cNvPr id="2" name="Titel 1">
             <a:extLst>
               <a:ext uri="{FF2B5EF4-FFF2-40B4-BE49-F238E27FC236}">
-                <a16:creationId xmlns="" xmlns:a16="http://schemas.microsoft.com/office/drawing/2014/main" id="{F06FB229-956A-4FC3-A601-A0AE4BF6D2CD}"/>
+                <a16:creationId xmlns:a16="http://schemas.microsoft.com/office/drawing/2014/main" xmlns="" id="{F06FB229-956A-4FC3-A601-A0AE4BF6D2CD}"/>
               </a:ext>
             </a:extLst>
           </p:cNvPr>
@@ -11347,7 +11347,7 @@
           <p:cNvPr id="3" name="Inhaltsplatzhalter 2">
             <a:extLst>
               <a:ext uri="{FF2B5EF4-FFF2-40B4-BE49-F238E27FC236}">
-                <a16:creationId xmlns="" xmlns:a16="http://schemas.microsoft.com/office/drawing/2014/main" id="{77C288AB-7F48-4654-AC1C-5844C26A718D}"/>
+                <a16:creationId xmlns:a16="http://schemas.microsoft.com/office/drawing/2014/main" xmlns="" id="{77C288AB-7F48-4654-AC1C-5844C26A718D}"/>
               </a:ext>
             </a:extLst>
           </p:cNvPr>
@@ -11437,7 +11437,7 @@
           <p:cNvPr id="4" name="Textplatzhalter 3">
             <a:extLst>
               <a:ext uri="{FF2B5EF4-FFF2-40B4-BE49-F238E27FC236}">
-                <a16:creationId xmlns="" xmlns:a16="http://schemas.microsoft.com/office/drawing/2014/main" id="{816A0FC8-5340-41CE-9D7F-D5E40D105614}"/>
+                <a16:creationId xmlns:a16="http://schemas.microsoft.com/office/drawing/2014/main" xmlns="" id="{816A0FC8-5340-41CE-9D7F-D5E40D105614}"/>
               </a:ext>
             </a:extLst>
           </p:cNvPr>
@@ -11508,7 +11508,7 @@
           <p:cNvPr id="5" name="Datumsplatzhalter 4">
             <a:extLst>
               <a:ext uri="{FF2B5EF4-FFF2-40B4-BE49-F238E27FC236}">
-                <a16:creationId xmlns="" xmlns:a16="http://schemas.microsoft.com/office/drawing/2014/main" id="{19A682CF-3F78-4739-9B07-7CE1EADC724A}"/>
+                <a16:creationId xmlns:a16="http://schemas.microsoft.com/office/drawing/2014/main" xmlns="" id="{19A682CF-3F78-4739-9B07-7CE1EADC724A}"/>
               </a:ext>
             </a:extLst>
           </p:cNvPr>
@@ -11549,7 +11549,7 @@
           <p:cNvPr id="6" name="Fußzeilenplatzhalter 5">
             <a:extLst>
               <a:ext uri="{FF2B5EF4-FFF2-40B4-BE49-F238E27FC236}">
-                <a16:creationId xmlns="" xmlns:a16="http://schemas.microsoft.com/office/drawing/2014/main" id="{042C8767-64B3-4151-9EB8-0F9D7A7E9977}"/>
+                <a16:creationId xmlns:a16="http://schemas.microsoft.com/office/drawing/2014/main" xmlns="" id="{042C8767-64B3-4151-9EB8-0F9D7A7E9977}"/>
               </a:ext>
             </a:extLst>
           </p:cNvPr>
@@ -11590,7 +11590,7 @@
           <p:cNvPr id="7" name="Foliennummernplatzhalter 6">
             <a:extLst>
               <a:ext uri="{FF2B5EF4-FFF2-40B4-BE49-F238E27FC236}">
-                <a16:creationId xmlns="" xmlns:a16="http://schemas.microsoft.com/office/drawing/2014/main" id="{28B1985B-D826-481C-BC22-6D616BBC92AF}"/>
+                <a16:creationId xmlns:a16="http://schemas.microsoft.com/office/drawing/2014/main" xmlns="" id="{28B1985B-D826-481C-BC22-6D616BBC92AF}"/>
               </a:ext>
             </a:extLst>
           </p:cNvPr>
@@ -11662,7 +11662,7 @@
           <p:cNvPr id="2" name="Titel 1">
             <a:extLst>
               <a:ext uri="{FF2B5EF4-FFF2-40B4-BE49-F238E27FC236}">
-                <a16:creationId xmlns="" xmlns:a16="http://schemas.microsoft.com/office/drawing/2014/main" id="{527C8192-F068-49DD-9D45-9C0FA71E6158}"/>
+                <a16:creationId xmlns:a16="http://schemas.microsoft.com/office/drawing/2014/main" xmlns="" id="{527C8192-F068-49DD-9D45-9C0FA71E6158}"/>
               </a:ext>
             </a:extLst>
           </p:cNvPr>
@@ -11699,7 +11699,7 @@
           <p:cNvPr id="3" name="Bildplatzhalter 2">
             <a:extLst>
               <a:ext uri="{FF2B5EF4-FFF2-40B4-BE49-F238E27FC236}">
-                <a16:creationId xmlns="" xmlns:a16="http://schemas.microsoft.com/office/drawing/2014/main" id="{D911F59A-C665-49BD-B41D-413CCCF7100B}"/>
+                <a16:creationId xmlns:a16="http://schemas.microsoft.com/office/drawing/2014/main" xmlns="" id="{D911F59A-C665-49BD-B41D-413CCCF7100B}"/>
               </a:ext>
             </a:extLst>
           </p:cNvPr>
@@ -11766,7 +11766,7 @@
           <p:cNvPr id="4" name="Textplatzhalter 3">
             <a:extLst>
               <a:ext uri="{FF2B5EF4-FFF2-40B4-BE49-F238E27FC236}">
-                <a16:creationId xmlns="" xmlns:a16="http://schemas.microsoft.com/office/drawing/2014/main" id="{0D2DB7AF-116E-4FF2-BDC3-7F062F23153B}"/>
+                <a16:creationId xmlns:a16="http://schemas.microsoft.com/office/drawing/2014/main" xmlns="" id="{0D2DB7AF-116E-4FF2-BDC3-7F062F23153B}"/>
               </a:ext>
             </a:extLst>
           </p:cNvPr>
@@ -11837,7 +11837,7 @@
           <p:cNvPr id="5" name="Datumsplatzhalter 4">
             <a:extLst>
               <a:ext uri="{FF2B5EF4-FFF2-40B4-BE49-F238E27FC236}">
-                <a16:creationId xmlns="" xmlns:a16="http://schemas.microsoft.com/office/drawing/2014/main" id="{F6C9E9C5-B341-4BF8-9201-3815A53E6B05}"/>
+                <a16:creationId xmlns:a16="http://schemas.microsoft.com/office/drawing/2014/main" xmlns="" id="{F6C9E9C5-B341-4BF8-9201-3815A53E6B05}"/>
               </a:ext>
             </a:extLst>
           </p:cNvPr>
@@ -11878,7 +11878,7 @@
           <p:cNvPr id="6" name="Fußzeilenplatzhalter 5">
             <a:extLst>
               <a:ext uri="{FF2B5EF4-FFF2-40B4-BE49-F238E27FC236}">
-                <a16:creationId xmlns="" xmlns:a16="http://schemas.microsoft.com/office/drawing/2014/main" id="{0FD9900E-6167-466A-8343-3A6ED4548CF7}"/>
+                <a16:creationId xmlns:a16="http://schemas.microsoft.com/office/drawing/2014/main" xmlns="" id="{0FD9900E-6167-466A-8343-3A6ED4548CF7}"/>
               </a:ext>
             </a:extLst>
           </p:cNvPr>
@@ -11919,7 +11919,7 @@
           <p:cNvPr id="7" name="Foliennummernplatzhalter 6">
             <a:extLst>
               <a:ext uri="{FF2B5EF4-FFF2-40B4-BE49-F238E27FC236}">
-                <a16:creationId xmlns="" xmlns:a16="http://schemas.microsoft.com/office/drawing/2014/main" id="{6B270861-890E-4564-AF31-768B4DCCE22F}"/>
+                <a16:creationId xmlns:a16="http://schemas.microsoft.com/office/drawing/2014/main" xmlns="" id="{6B270861-890E-4564-AF31-768B4DCCE22F}"/>
               </a:ext>
             </a:extLst>
           </p:cNvPr>
@@ -12487,7 +12487,7 @@
           <p:cNvPr id="2" name="Titel 1">
             <a:extLst>
               <a:ext uri="{FF2B5EF4-FFF2-40B4-BE49-F238E27FC236}">
-                <a16:creationId xmlns="" xmlns:a16="http://schemas.microsoft.com/office/drawing/2014/main" id="{65B84212-09D1-4509-9353-ADC7BA7DA87C}"/>
+                <a16:creationId xmlns:a16="http://schemas.microsoft.com/office/drawing/2014/main" xmlns="" id="{65B84212-09D1-4509-9353-ADC7BA7DA87C}"/>
               </a:ext>
             </a:extLst>
           </p:cNvPr>
@@ -12515,7 +12515,7 @@
           <p:cNvPr id="3" name="Vertikaler Textplatzhalter 2">
             <a:extLst>
               <a:ext uri="{FF2B5EF4-FFF2-40B4-BE49-F238E27FC236}">
-                <a16:creationId xmlns="" xmlns:a16="http://schemas.microsoft.com/office/drawing/2014/main" id="{8F4924CF-B7F7-4306-A178-08A966433235}"/>
+                <a16:creationId xmlns:a16="http://schemas.microsoft.com/office/drawing/2014/main" xmlns="" id="{8F4924CF-B7F7-4306-A178-08A966433235}"/>
               </a:ext>
             </a:extLst>
           </p:cNvPr>
@@ -12572,7 +12572,7 @@
           <p:cNvPr id="4" name="Datumsplatzhalter 3">
             <a:extLst>
               <a:ext uri="{FF2B5EF4-FFF2-40B4-BE49-F238E27FC236}">
-                <a16:creationId xmlns="" xmlns:a16="http://schemas.microsoft.com/office/drawing/2014/main" id="{D09162EC-70D2-4064-9D17-E43D0B66AB15}"/>
+                <a16:creationId xmlns:a16="http://schemas.microsoft.com/office/drawing/2014/main" xmlns="" id="{D09162EC-70D2-4064-9D17-E43D0B66AB15}"/>
               </a:ext>
             </a:extLst>
           </p:cNvPr>
@@ -12613,7 +12613,7 @@
           <p:cNvPr id="5" name="Fußzeilenplatzhalter 4">
             <a:extLst>
               <a:ext uri="{FF2B5EF4-FFF2-40B4-BE49-F238E27FC236}">
-                <a16:creationId xmlns="" xmlns:a16="http://schemas.microsoft.com/office/drawing/2014/main" id="{D4755F2A-7C65-45D1-A178-48C969CD9C25}"/>
+                <a16:creationId xmlns:a16="http://schemas.microsoft.com/office/drawing/2014/main" xmlns="" id="{D4755F2A-7C65-45D1-A178-48C969CD9C25}"/>
               </a:ext>
             </a:extLst>
           </p:cNvPr>
@@ -12654,7 +12654,7 @@
           <p:cNvPr id="6" name="Foliennummernplatzhalter 5">
             <a:extLst>
               <a:ext uri="{FF2B5EF4-FFF2-40B4-BE49-F238E27FC236}">
-                <a16:creationId xmlns="" xmlns:a16="http://schemas.microsoft.com/office/drawing/2014/main" id="{CAEB7D33-33CB-4797-B737-15909722646E}"/>
+                <a16:creationId xmlns:a16="http://schemas.microsoft.com/office/drawing/2014/main" xmlns="" id="{CAEB7D33-33CB-4797-B737-15909722646E}"/>
               </a:ext>
             </a:extLst>
           </p:cNvPr>
@@ -12726,7 +12726,7 @@
           <p:cNvPr id="2" name="Vertikaler Titel 1">
             <a:extLst>
               <a:ext uri="{FF2B5EF4-FFF2-40B4-BE49-F238E27FC236}">
-                <a16:creationId xmlns="" xmlns:a16="http://schemas.microsoft.com/office/drawing/2014/main" id="{EE96332C-B44E-46D2-99C6-C3DA800A9BDB}"/>
+                <a16:creationId xmlns:a16="http://schemas.microsoft.com/office/drawing/2014/main" xmlns="" id="{EE96332C-B44E-46D2-99C6-C3DA800A9BDB}"/>
               </a:ext>
             </a:extLst>
           </p:cNvPr>
@@ -12759,7 +12759,7 @@
           <p:cNvPr id="3" name="Vertikaler Textplatzhalter 2">
             <a:extLst>
               <a:ext uri="{FF2B5EF4-FFF2-40B4-BE49-F238E27FC236}">
-                <a16:creationId xmlns="" xmlns:a16="http://schemas.microsoft.com/office/drawing/2014/main" id="{12C0143B-88E3-494D-A148-91913934E5EB}"/>
+                <a16:creationId xmlns:a16="http://schemas.microsoft.com/office/drawing/2014/main" xmlns="" id="{12C0143B-88E3-494D-A148-91913934E5EB}"/>
               </a:ext>
             </a:extLst>
           </p:cNvPr>
@@ -12821,7 +12821,7 @@
           <p:cNvPr id="4" name="Datumsplatzhalter 3">
             <a:extLst>
               <a:ext uri="{FF2B5EF4-FFF2-40B4-BE49-F238E27FC236}">
-                <a16:creationId xmlns="" xmlns:a16="http://schemas.microsoft.com/office/drawing/2014/main" id="{F40E2C0A-E743-478F-ADB0-3D7669BE35CF}"/>
+                <a16:creationId xmlns:a16="http://schemas.microsoft.com/office/drawing/2014/main" xmlns="" id="{F40E2C0A-E743-478F-ADB0-3D7669BE35CF}"/>
               </a:ext>
             </a:extLst>
           </p:cNvPr>
@@ -12862,7 +12862,7 @@
           <p:cNvPr id="5" name="Fußzeilenplatzhalter 4">
             <a:extLst>
               <a:ext uri="{FF2B5EF4-FFF2-40B4-BE49-F238E27FC236}">
-                <a16:creationId xmlns="" xmlns:a16="http://schemas.microsoft.com/office/drawing/2014/main" id="{80E646D1-009B-4AB7-9FED-56FCFF8556DB}"/>
+                <a16:creationId xmlns:a16="http://schemas.microsoft.com/office/drawing/2014/main" xmlns="" id="{80E646D1-009B-4AB7-9FED-56FCFF8556DB}"/>
               </a:ext>
             </a:extLst>
           </p:cNvPr>
@@ -12903,7 +12903,7 @@
           <p:cNvPr id="6" name="Foliennummernplatzhalter 5">
             <a:extLst>
               <a:ext uri="{FF2B5EF4-FFF2-40B4-BE49-F238E27FC236}">
-                <a16:creationId xmlns="" xmlns:a16="http://schemas.microsoft.com/office/drawing/2014/main" id="{5CF0614C-DA10-4BAE-90AB-DC1D5523AE13}"/>
+                <a16:creationId xmlns:a16="http://schemas.microsoft.com/office/drawing/2014/main" xmlns="" id="{5CF0614C-DA10-4BAE-90AB-DC1D5523AE13}"/>
               </a:ext>
             </a:extLst>
           </p:cNvPr>
@@ -17555,7 +17555,7 @@
           <p:cNvPr id="2" name="Titelplatzhalter 1">
             <a:extLst>
               <a:ext uri="{FF2B5EF4-FFF2-40B4-BE49-F238E27FC236}">
-                <a16:creationId xmlns="" xmlns:a16="http://schemas.microsoft.com/office/drawing/2014/main" id="{BD76D2F4-AB0E-4003-BEC5-6233DEAE2EE3}"/>
+                <a16:creationId xmlns:a16="http://schemas.microsoft.com/office/drawing/2014/main" xmlns="" id="{BD76D2F4-AB0E-4003-BEC5-6233DEAE2EE3}"/>
               </a:ext>
             </a:extLst>
           </p:cNvPr>
@@ -17593,7 +17593,7 @@
           <p:cNvPr id="3" name="Textplatzhalter 2">
             <a:extLst>
               <a:ext uri="{FF2B5EF4-FFF2-40B4-BE49-F238E27FC236}">
-                <a16:creationId xmlns="" xmlns:a16="http://schemas.microsoft.com/office/drawing/2014/main" id="{B3DF9D16-F525-48A0-B6BF-34F51C606548}"/>
+                <a16:creationId xmlns:a16="http://schemas.microsoft.com/office/drawing/2014/main" xmlns="" id="{B3DF9D16-F525-48A0-B6BF-34F51C606548}"/>
               </a:ext>
             </a:extLst>
           </p:cNvPr>
@@ -17660,7 +17660,7 @@
           <p:cNvPr id="4" name="Datumsplatzhalter 3">
             <a:extLst>
               <a:ext uri="{FF2B5EF4-FFF2-40B4-BE49-F238E27FC236}">
-                <a16:creationId xmlns="" xmlns:a16="http://schemas.microsoft.com/office/drawing/2014/main" id="{35D46495-69C0-4970-9B93-B0D3A313D663}"/>
+                <a16:creationId xmlns:a16="http://schemas.microsoft.com/office/drawing/2014/main" xmlns="" id="{35D46495-69C0-4970-9B93-B0D3A313D663}"/>
               </a:ext>
             </a:extLst>
           </p:cNvPr>
@@ -17720,7 +17720,7 @@
           <p:cNvPr id="5" name="Fußzeilenplatzhalter 4">
             <a:extLst>
               <a:ext uri="{FF2B5EF4-FFF2-40B4-BE49-F238E27FC236}">
-                <a16:creationId xmlns="" xmlns:a16="http://schemas.microsoft.com/office/drawing/2014/main" id="{E70F8F24-E065-4612-AD81-C0A43872EFA7}"/>
+                <a16:creationId xmlns:a16="http://schemas.microsoft.com/office/drawing/2014/main" xmlns="" id="{E70F8F24-E065-4612-AD81-C0A43872EFA7}"/>
               </a:ext>
             </a:extLst>
           </p:cNvPr>
@@ -17780,7 +17780,7 @@
           <p:cNvPr id="6" name="Foliennummernplatzhalter 5">
             <a:extLst>
               <a:ext uri="{FF2B5EF4-FFF2-40B4-BE49-F238E27FC236}">
-                <a16:creationId xmlns="" xmlns:a16="http://schemas.microsoft.com/office/drawing/2014/main" id="{FE567765-8802-4837-ABFA-B703E3FF1D7A}"/>
+                <a16:creationId xmlns:a16="http://schemas.microsoft.com/office/drawing/2014/main" xmlns="" id="{FE567765-8802-4837-ABFA-B703E3FF1D7A}"/>
               </a:ext>
             </a:extLst>
           </p:cNvPr>
@@ -18628,8 +18628,13 @@
             <a:pPr lvl="1"/>
             <a:r>
               <a:rPr lang="de-DE" dirty="0" smtClean="0"/>
-              <a:t>Wissen über Sockets an Beispielen erarbeitet.</a:t>
-            </a:r>
+              <a:t>Wissen über Sockets an Beispielen </a:t>
+            </a:r>
+            <a:r>
+              <a:rPr lang="de-DE" dirty="0" smtClean="0"/>
+              <a:t>erarbeitet</a:t>
+            </a:r>
+            <a:endParaRPr lang="de-DE" dirty="0" smtClean="0"/>
           </a:p>
           <a:p>
             <a:pPr lvl="1"/>
@@ -22328,11 +22333,7 @@
             </a:r>
             <a:r>
               <a:rPr lang="de-DE" dirty="0" smtClean="0"/>
-              <a:t>, Andreas Klamm, Charles </a:t>
-            </a:r>
-            <a:r>
-              <a:rPr lang="de-DE" dirty="0" smtClean="0"/>
-              <a:t>Anthony</a:t>
+              <a:t>, Andreas Klamm, Charles Anthony</a:t>
             </a:r>
           </a:p>
           <a:p>
@@ -22340,7 +22341,6 @@
               <a:rPr lang="de-DE" dirty="0" smtClean="0"/>
               <a:t>XML: Norman Dettmer</a:t>
             </a:r>
-            <a:endParaRPr lang="de-DE" dirty="0" smtClean="0"/>
           </a:p>
           <a:p>
             <a:r>
@@ -25264,8 +25264,24 @@
             <a:pPr lvl="1"/>
             <a:r>
               <a:rPr lang="de-DE" dirty="0" smtClean="0"/>
-              <a:t>Die Übergabe der Arraylist in Observabel List</a:t>
-            </a:r>
+              <a:t>Die Übergabe der Arraylist in Observabel </a:t>
+            </a:r>
+            <a:r>
+              <a:rPr lang="de-DE" dirty="0" smtClean="0"/>
+              <a:t>List</a:t>
+            </a:r>
+          </a:p>
+          <a:p>
+            <a:pPr lvl="1"/>
+            <a:r>
+              <a:rPr lang="de-DE" dirty="0"/>
+              <a:t>Es wurde nur eine Kopie der Arraylist </a:t>
+            </a:r>
+            <a:r>
+              <a:rPr lang="de-DE" dirty="0" smtClean="0"/>
+              <a:t>übergeben</a:t>
+            </a:r>
+            <a:endParaRPr lang="de-DE" dirty="0" smtClean="0"/>
           </a:p>
           <a:p>
             <a:pPr lvl="1"/>
@@ -25288,16 +25304,13 @@
             <a:pPr lvl="1"/>
             <a:r>
               <a:rPr lang="de-DE" dirty="0" smtClean="0"/>
-              <a:t>GUI Observable List übergeben werden</a:t>
-            </a:r>
-          </a:p>
-          <a:p>
-            <a:pPr lvl="1"/>
+              <a:t>GUI Observable List übergeben </a:t>
+            </a:r>
             <a:r>
               <a:rPr lang="de-DE" dirty="0" smtClean="0"/>
-              <a:t>Es wurde nur eine Kopie der Arraylist übergeben</a:t>
-            </a:r>
-            <a:endParaRPr lang="de-DE" dirty="0"/>
+              <a:t>werden</a:t>
+            </a:r>
+            <a:endParaRPr lang="de-DE" dirty="0" smtClean="0"/>
           </a:p>
         </p:txBody>
       </p:sp>

</xml_diff>